<commit_message>
Update Praxis site with fresh slide deck
</commit_message>
<xml_diff>
--- a/assets/workshop-on-workshops/workshop-on-workshops.pptx
+++ b/assets/workshop-on-workshops/workshop-on-workshops.pptx
@@ -5,7 +5,7 @@
     <p:sldMasterId id="2147483648" r:id="rId1"/>
   </p:sldMasterIdLst>
   <p:notesMasterIdLst>
-    <p:notesMasterId r:id="rId28"/>
+    <p:notesMasterId r:id="rId29"/>
   </p:notesMasterIdLst>
   <p:sldIdLst>
     <p:sldId id="256" r:id="rId2"/>
@@ -33,7 +33,8 @@
     <p:sldId id="258" r:id="rId24"/>
     <p:sldId id="294" r:id="rId25"/>
     <p:sldId id="295" r:id="rId26"/>
-    <p:sldId id="298" r:id="rId27"/>
+    <p:sldId id="300" r:id="rId27"/>
+    <p:sldId id="298" r:id="rId28"/>
   </p:sldIdLst>
   <p:sldSz cx="12192000" cy="6858000"/>
   <p:notesSz cx="6858000" cy="9144000"/>
@@ -134,7 +135,18 @@
   </p:defaultTextStyle>
   <p:extLst>
     <p:ext uri="{EFAFB233-063F-42B5-8137-9DF3F51BA10A}">
-      <p15:sldGuideLst xmlns:p15="http://schemas.microsoft.com/office/powerpoint/2012/main" xmlns=""/>
+      <p15:sldGuideLst xmlns:p15="http://schemas.microsoft.com/office/powerpoint/2012/main">
+        <p15:guide id="1" orient="horz" pos="2160">
+          <p15:clr>
+            <a:srgbClr val="A4A3A4"/>
+          </p15:clr>
+        </p15:guide>
+        <p15:guide id="2" pos="3840">
+          <p15:clr>
+            <a:srgbClr val="A4A3A4"/>
+          </p15:clr>
+        </p15:guide>
+      </p15:sldGuideLst>
     </p:ext>
   </p:extLst>
 </p:presentation>
@@ -221,7 +233,7 @@
           </a:lstStyle>
           <a:p>
             <a:fld id="{D1872EBC-2E3C-CF45-9A4B-623097783979}" type="datetimeFigureOut">
-              <a:t>9/18/19</a:t>
+              <a:t>9/17/20</a:t>
             </a:fld>
             <a:endParaRPr lang="en-US"/>
           </a:p>
@@ -1239,6 +1251,90 @@
           <a:bodyPr/>
           <a:lstStyle/>
           <a:p>
+            <a:endParaRPr lang="en-US" dirty="0"/>
+          </a:p>
+        </p:txBody>
+      </p:sp>
+      <p:sp>
+        <p:nvSpPr>
+          <p:cNvPr id="4" name="Slide Number Placeholder 3"/>
+          <p:cNvSpPr>
+            <a:spLocks noGrp="1"/>
+          </p:cNvSpPr>
+          <p:nvPr>
+            <p:ph type="sldNum" sz="quarter" idx="5"/>
+          </p:nvPr>
+        </p:nvSpPr>
+        <p:spPr/>
+        <p:txBody>
+          <a:bodyPr/>
+          <a:lstStyle/>
+          <a:p>
+            <a:fld id="{B12B715B-618E-024D-9745-4BA83BFF9D40}" type="slidenum">
+              <a:rPr lang="en-US" smtClean="0"/>
+              <a:t>23</a:t>
+            </a:fld>
+            <a:endParaRPr lang="en-US"/>
+          </a:p>
+        </p:txBody>
+      </p:sp>
+    </p:spTree>
+    <p:extLst>
+      <p:ext uri="{BB962C8B-B14F-4D97-AF65-F5344CB8AC3E}">
+        <p14:creationId xmlns:p14="http://schemas.microsoft.com/office/powerpoint/2010/main" val="3786936111"/>
+      </p:ext>
+    </p:extLst>
+  </p:cSld>
+  <p:clrMapOvr>
+    <a:masterClrMapping/>
+  </p:clrMapOvr>
+</p:notes>
+</file>
+
+<file path=ppt/notesSlides/notesSlide17.xml><?xml version="1.0" encoding="utf-8"?>
+<p:notes xmlns:a="http://schemas.openxmlformats.org/drawingml/2006/main" xmlns:r="http://schemas.openxmlformats.org/officeDocument/2006/relationships" xmlns:p="http://schemas.openxmlformats.org/presentationml/2006/main">
+  <p:cSld>
+    <p:spTree>
+      <p:nvGrpSpPr>
+        <p:cNvPr id="1" name=""/>
+        <p:cNvGrpSpPr/>
+        <p:nvPr/>
+      </p:nvGrpSpPr>
+      <p:grpSpPr>
+        <a:xfrm>
+          <a:off x="0" y="0"/>
+          <a:ext cx="0" cy="0"/>
+          <a:chOff x="0" y="0"/>
+          <a:chExt cx="0" cy="0"/>
+        </a:xfrm>
+      </p:grpSpPr>
+      <p:sp>
+        <p:nvSpPr>
+          <p:cNvPr id="2" name="Slide Image Placeholder 1"/>
+          <p:cNvSpPr>
+            <a:spLocks noGrp="1" noRot="1" noChangeAspect="1"/>
+          </p:cNvSpPr>
+          <p:nvPr>
+            <p:ph type="sldImg"/>
+          </p:nvPr>
+        </p:nvSpPr>
+        <p:spPr/>
+      </p:sp>
+      <p:sp>
+        <p:nvSpPr>
+          <p:cNvPr id="3" name="Notes Placeholder 2"/>
+          <p:cNvSpPr>
+            <a:spLocks noGrp="1"/>
+          </p:cNvSpPr>
+          <p:nvPr>
+            <p:ph type="body" idx="1"/>
+          </p:nvPr>
+        </p:nvSpPr>
+        <p:spPr/>
+        <p:txBody>
+          <a:bodyPr/>
+          <a:lstStyle/>
+          <a:p>
             <a:r>
               <a:rPr lang="en-US"/>
               <a:t>What were their reactions to digital pedagogy in the humanities?</a:t>
@@ -2209,7 +2305,7 @@
           <p:cNvPr id="2" name="Title 1">
             <a:extLst>
               <a:ext uri="{FF2B5EF4-FFF2-40B4-BE49-F238E27FC236}">
-                <a16:creationId xmlns:a16="http://schemas.microsoft.com/office/drawing/2014/main" xmlns="" id="{4BB1AA9B-75E5-FD4C-9434-81A1526FDA89}"/>
+                <a16:creationId xmlns:a16="http://schemas.microsoft.com/office/drawing/2014/main" id="{4BB1AA9B-75E5-FD4C-9434-81A1526FDA89}"/>
               </a:ext>
             </a:extLst>
           </p:cNvPr>
@@ -2246,7 +2342,7 @@
           <p:cNvPr id="3" name="Subtitle 2">
             <a:extLst>
               <a:ext uri="{FF2B5EF4-FFF2-40B4-BE49-F238E27FC236}">
-                <a16:creationId xmlns:a16="http://schemas.microsoft.com/office/drawing/2014/main" xmlns="" id="{9E78FADD-A0D9-7343-9724-ACAC00BCA3C3}"/>
+                <a16:creationId xmlns:a16="http://schemas.microsoft.com/office/drawing/2014/main" id="{9E78FADD-A0D9-7343-9724-ACAC00BCA3C3}"/>
               </a:ext>
             </a:extLst>
           </p:cNvPr>
@@ -2316,7 +2412,7 @@
           <p:cNvPr id="4" name="Date Placeholder 3">
             <a:extLst>
               <a:ext uri="{FF2B5EF4-FFF2-40B4-BE49-F238E27FC236}">
-                <a16:creationId xmlns:a16="http://schemas.microsoft.com/office/drawing/2014/main" xmlns="" id="{8941052E-22FC-AD41-88F7-26DA74BF1CA7}"/>
+                <a16:creationId xmlns:a16="http://schemas.microsoft.com/office/drawing/2014/main" id="{8941052E-22FC-AD41-88F7-26DA74BF1CA7}"/>
               </a:ext>
             </a:extLst>
           </p:cNvPr>
@@ -2333,7 +2429,7 @@
           <a:lstStyle/>
           <a:p>
             <a:fld id="{6B939D22-5EF9-9546-AAFA-1A29548E4F74}" type="datetimeFigureOut">
-              <a:t>9/18/19</a:t>
+              <a:t>9/17/20</a:t>
             </a:fld>
             <a:endParaRPr lang="en-US"/>
           </a:p>
@@ -2344,7 +2440,7 @@
           <p:cNvPr id="5" name="Footer Placeholder 4">
             <a:extLst>
               <a:ext uri="{FF2B5EF4-FFF2-40B4-BE49-F238E27FC236}">
-                <a16:creationId xmlns:a16="http://schemas.microsoft.com/office/drawing/2014/main" xmlns="" id="{CFBF15DC-F4EC-574E-8B34-01608999A65A}"/>
+                <a16:creationId xmlns:a16="http://schemas.microsoft.com/office/drawing/2014/main" id="{CFBF15DC-F4EC-574E-8B34-01608999A65A}"/>
               </a:ext>
             </a:extLst>
           </p:cNvPr>
@@ -2369,7 +2465,7 @@
           <p:cNvPr id="6" name="Slide Number Placeholder 5">
             <a:extLst>
               <a:ext uri="{FF2B5EF4-FFF2-40B4-BE49-F238E27FC236}">
-                <a16:creationId xmlns:a16="http://schemas.microsoft.com/office/drawing/2014/main" xmlns="" id="{EAF3A25D-AECB-CB4E-9DDC-955BC789FE61}"/>
+                <a16:creationId xmlns:a16="http://schemas.microsoft.com/office/drawing/2014/main" id="{EAF3A25D-AECB-CB4E-9DDC-955BC789FE61}"/>
               </a:ext>
             </a:extLst>
           </p:cNvPr>
@@ -2427,7 +2523,7 @@
           <p:cNvPr id="2" name="Title 1">
             <a:extLst>
               <a:ext uri="{FF2B5EF4-FFF2-40B4-BE49-F238E27FC236}">
-                <a16:creationId xmlns:a16="http://schemas.microsoft.com/office/drawing/2014/main" xmlns="" id="{9F00C500-7ACC-9444-828A-C4CDE26ED831}"/>
+                <a16:creationId xmlns:a16="http://schemas.microsoft.com/office/drawing/2014/main" id="{9F00C500-7ACC-9444-828A-C4CDE26ED831}"/>
               </a:ext>
             </a:extLst>
           </p:cNvPr>
@@ -2455,7 +2551,7 @@
           <p:cNvPr id="3" name="Vertical Text Placeholder 2">
             <a:extLst>
               <a:ext uri="{FF2B5EF4-FFF2-40B4-BE49-F238E27FC236}">
-                <a16:creationId xmlns:a16="http://schemas.microsoft.com/office/drawing/2014/main" xmlns="" id="{0D4BC144-9DE1-4B42-9FA5-2C98BE1794DB}"/>
+                <a16:creationId xmlns:a16="http://schemas.microsoft.com/office/drawing/2014/main" id="{0D4BC144-9DE1-4B42-9FA5-2C98BE1794DB}"/>
               </a:ext>
             </a:extLst>
           </p:cNvPr>
@@ -2512,7 +2608,7 @@
           <p:cNvPr id="4" name="Date Placeholder 3">
             <a:extLst>
               <a:ext uri="{FF2B5EF4-FFF2-40B4-BE49-F238E27FC236}">
-                <a16:creationId xmlns:a16="http://schemas.microsoft.com/office/drawing/2014/main" xmlns="" id="{7D7EC5EB-BBED-6A48-B8C7-968879F53959}"/>
+                <a16:creationId xmlns:a16="http://schemas.microsoft.com/office/drawing/2014/main" id="{7D7EC5EB-BBED-6A48-B8C7-968879F53959}"/>
               </a:ext>
             </a:extLst>
           </p:cNvPr>
@@ -2529,7 +2625,7 @@
           <a:lstStyle/>
           <a:p>
             <a:fld id="{6B939D22-5EF9-9546-AAFA-1A29548E4F74}" type="datetimeFigureOut">
-              <a:t>9/18/19</a:t>
+              <a:t>9/17/20</a:t>
             </a:fld>
             <a:endParaRPr lang="en-US"/>
           </a:p>
@@ -2540,7 +2636,7 @@
           <p:cNvPr id="5" name="Footer Placeholder 4">
             <a:extLst>
               <a:ext uri="{FF2B5EF4-FFF2-40B4-BE49-F238E27FC236}">
-                <a16:creationId xmlns:a16="http://schemas.microsoft.com/office/drawing/2014/main" xmlns="" id="{1E5834CD-8410-144F-8BE9-EF1272453044}"/>
+                <a16:creationId xmlns:a16="http://schemas.microsoft.com/office/drawing/2014/main" id="{1E5834CD-8410-144F-8BE9-EF1272453044}"/>
               </a:ext>
             </a:extLst>
           </p:cNvPr>
@@ -2565,7 +2661,7 @@
           <p:cNvPr id="6" name="Slide Number Placeholder 5">
             <a:extLst>
               <a:ext uri="{FF2B5EF4-FFF2-40B4-BE49-F238E27FC236}">
-                <a16:creationId xmlns:a16="http://schemas.microsoft.com/office/drawing/2014/main" xmlns="" id="{5CFDE0DE-9CD3-E14B-923E-DFAF8279901D}"/>
+                <a16:creationId xmlns:a16="http://schemas.microsoft.com/office/drawing/2014/main" id="{5CFDE0DE-9CD3-E14B-923E-DFAF8279901D}"/>
               </a:ext>
             </a:extLst>
           </p:cNvPr>
@@ -2623,7 +2719,7 @@
           <p:cNvPr id="2" name="Vertical Title 1">
             <a:extLst>
               <a:ext uri="{FF2B5EF4-FFF2-40B4-BE49-F238E27FC236}">
-                <a16:creationId xmlns:a16="http://schemas.microsoft.com/office/drawing/2014/main" xmlns="" id="{B3C34DE1-A6C2-4840-A81B-1725562E4F88}"/>
+                <a16:creationId xmlns:a16="http://schemas.microsoft.com/office/drawing/2014/main" id="{B3C34DE1-A6C2-4840-A81B-1725562E4F88}"/>
               </a:ext>
             </a:extLst>
           </p:cNvPr>
@@ -2656,7 +2752,7 @@
           <p:cNvPr id="3" name="Vertical Text Placeholder 2">
             <a:extLst>
               <a:ext uri="{FF2B5EF4-FFF2-40B4-BE49-F238E27FC236}">
-                <a16:creationId xmlns:a16="http://schemas.microsoft.com/office/drawing/2014/main" xmlns="" id="{B9680262-9136-874E-A594-41883D7CD29A}"/>
+                <a16:creationId xmlns:a16="http://schemas.microsoft.com/office/drawing/2014/main" id="{B9680262-9136-874E-A594-41883D7CD29A}"/>
               </a:ext>
             </a:extLst>
           </p:cNvPr>
@@ -2718,7 +2814,7 @@
           <p:cNvPr id="4" name="Date Placeholder 3">
             <a:extLst>
               <a:ext uri="{FF2B5EF4-FFF2-40B4-BE49-F238E27FC236}">
-                <a16:creationId xmlns:a16="http://schemas.microsoft.com/office/drawing/2014/main" xmlns="" id="{D0C9EAF5-1CE7-A84D-8E0C-869746F52D30}"/>
+                <a16:creationId xmlns:a16="http://schemas.microsoft.com/office/drawing/2014/main" id="{D0C9EAF5-1CE7-A84D-8E0C-869746F52D30}"/>
               </a:ext>
             </a:extLst>
           </p:cNvPr>
@@ -2735,7 +2831,7 @@
           <a:lstStyle/>
           <a:p>
             <a:fld id="{6B939D22-5EF9-9546-AAFA-1A29548E4F74}" type="datetimeFigureOut">
-              <a:t>9/18/19</a:t>
+              <a:t>9/17/20</a:t>
             </a:fld>
             <a:endParaRPr lang="en-US"/>
           </a:p>
@@ -2746,7 +2842,7 @@
           <p:cNvPr id="5" name="Footer Placeholder 4">
             <a:extLst>
               <a:ext uri="{FF2B5EF4-FFF2-40B4-BE49-F238E27FC236}">
-                <a16:creationId xmlns:a16="http://schemas.microsoft.com/office/drawing/2014/main" xmlns="" id="{CDB14378-B34C-5F4D-A751-23459510FB4E}"/>
+                <a16:creationId xmlns:a16="http://schemas.microsoft.com/office/drawing/2014/main" id="{CDB14378-B34C-5F4D-A751-23459510FB4E}"/>
               </a:ext>
             </a:extLst>
           </p:cNvPr>
@@ -2771,7 +2867,7 @@
           <p:cNvPr id="6" name="Slide Number Placeholder 5">
             <a:extLst>
               <a:ext uri="{FF2B5EF4-FFF2-40B4-BE49-F238E27FC236}">
-                <a16:creationId xmlns:a16="http://schemas.microsoft.com/office/drawing/2014/main" xmlns="" id="{AA4D6E2C-33BD-2C41-A4B5-6B66F5E5DD06}"/>
+                <a16:creationId xmlns:a16="http://schemas.microsoft.com/office/drawing/2014/main" id="{AA4D6E2C-33BD-2C41-A4B5-6B66F5E5DD06}"/>
               </a:ext>
             </a:extLst>
           </p:cNvPr>
@@ -2829,7 +2925,7 @@
           <p:cNvPr id="2" name="Title 1">
             <a:extLst>
               <a:ext uri="{FF2B5EF4-FFF2-40B4-BE49-F238E27FC236}">
-                <a16:creationId xmlns:a16="http://schemas.microsoft.com/office/drawing/2014/main" xmlns="" id="{EA6C90D5-3C4D-C844-9E54-93A2BA33C2C3}"/>
+                <a16:creationId xmlns:a16="http://schemas.microsoft.com/office/drawing/2014/main" id="{EA6C90D5-3C4D-C844-9E54-93A2BA33C2C3}"/>
               </a:ext>
             </a:extLst>
           </p:cNvPr>
@@ -2857,7 +2953,7 @@
           <p:cNvPr id="3" name="Content Placeholder 2">
             <a:extLst>
               <a:ext uri="{FF2B5EF4-FFF2-40B4-BE49-F238E27FC236}">
-                <a16:creationId xmlns:a16="http://schemas.microsoft.com/office/drawing/2014/main" xmlns="" id="{315C89EB-F9CD-FB45-B306-0084799A14C6}"/>
+                <a16:creationId xmlns:a16="http://schemas.microsoft.com/office/drawing/2014/main" id="{315C89EB-F9CD-FB45-B306-0084799A14C6}"/>
               </a:ext>
             </a:extLst>
           </p:cNvPr>
@@ -2914,7 +3010,7 @@
           <p:cNvPr id="4" name="Date Placeholder 3">
             <a:extLst>
               <a:ext uri="{FF2B5EF4-FFF2-40B4-BE49-F238E27FC236}">
-                <a16:creationId xmlns:a16="http://schemas.microsoft.com/office/drawing/2014/main" xmlns="" id="{054EB14F-ECBE-A044-9080-A98B7039C578}"/>
+                <a16:creationId xmlns:a16="http://schemas.microsoft.com/office/drawing/2014/main" id="{054EB14F-ECBE-A044-9080-A98B7039C578}"/>
               </a:ext>
             </a:extLst>
           </p:cNvPr>
@@ -2931,7 +3027,7 @@
           <a:lstStyle/>
           <a:p>
             <a:fld id="{6B939D22-5EF9-9546-AAFA-1A29548E4F74}" type="datetimeFigureOut">
-              <a:t>9/18/19</a:t>
+              <a:t>9/17/20</a:t>
             </a:fld>
             <a:endParaRPr lang="en-US"/>
           </a:p>
@@ -2942,7 +3038,7 @@
           <p:cNvPr id="5" name="Footer Placeholder 4">
             <a:extLst>
               <a:ext uri="{FF2B5EF4-FFF2-40B4-BE49-F238E27FC236}">
-                <a16:creationId xmlns:a16="http://schemas.microsoft.com/office/drawing/2014/main" xmlns="" id="{1B173ED3-393B-BE45-8BDD-A9322848E820}"/>
+                <a16:creationId xmlns:a16="http://schemas.microsoft.com/office/drawing/2014/main" id="{1B173ED3-393B-BE45-8BDD-A9322848E820}"/>
               </a:ext>
             </a:extLst>
           </p:cNvPr>
@@ -2967,7 +3063,7 @@
           <p:cNvPr id="6" name="Slide Number Placeholder 5">
             <a:extLst>
               <a:ext uri="{FF2B5EF4-FFF2-40B4-BE49-F238E27FC236}">
-                <a16:creationId xmlns:a16="http://schemas.microsoft.com/office/drawing/2014/main" xmlns="" id="{4446B4E5-0FEE-384E-A55D-1299E48C2D7B}"/>
+                <a16:creationId xmlns:a16="http://schemas.microsoft.com/office/drawing/2014/main" id="{4446B4E5-0FEE-384E-A55D-1299E48C2D7B}"/>
               </a:ext>
             </a:extLst>
           </p:cNvPr>
@@ -3025,7 +3121,7 @@
           <p:cNvPr id="2" name="Title 1">
             <a:extLst>
               <a:ext uri="{FF2B5EF4-FFF2-40B4-BE49-F238E27FC236}">
-                <a16:creationId xmlns:a16="http://schemas.microsoft.com/office/drawing/2014/main" xmlns="" id="{4684152C-DA96-6F4D-A6A5-9A1C8A073D1E}"/>
+                <a16:creationId xmlns:a16="http://schemas.microsoft.com/office/drawing/2014/main" id="{4684152C-DA96-6F4D-A6A5-9A1C8A073D1E}"/>
               </a:ext>
             </a:extLst>
           </p:cNvPr>
@@ -3062,7 +3158,7 @@
           <p:cNvPr id="3" name="Text Placeholder 2">
             <a:extLst>
               <a:ext uri="{FF2B5EF4-FFF2-40B4-BE49-F238E27FC236}">
-                <a16:creationId xmlns:a16="http://schemas.microsoft.com/office/drawing/2014/main" xmlns="" id="{F9F28458-0275-3243-B5E2-D8478BF4D0EB}"/>
+                <a16:creationId xmlns:a16="http://schemas.microsoft.com/office/drawing/2014/main" id="{F9F28458-0275-3243-B5E2-D8478BF4D0EB}"/>
               </a:ext>
             </a:extLst>
           </p:cNvPr>
@@ -3187,7 +3283,7 @@
           <p:cNvPr id="4" name="Date Placeholder 3">
             <a:extLst>
               <a:ext uri="{FF2B5EF4-FFF2-40B4-BE49-F238E27FC236}">
-                <a16:creationId xmlns:a16="http://schemas.microsoft.com/office/drawing/2014/main" xmlns="" id="{640C4CFE-C3A2-EE4A-A07A-60F407FF4C49}"/>
+                <a16:creationId xmlns:a16="http://schemas.microsoft.com/office/drawing/2014/main" id="{640C4CFE-C3A2-EE4A-A07A-60F407FF4C49}"/>
               </a:ext>
             </a:extLst>
           </p:cNvPr>
@@ -3204,7 +3300,7 @@
           <a:lstStyle/>
           <a:p>
             <a:fld id="{6B939D22-5EF9-9546-AAFA-1A29548E4F74}" type="datetimeFigureOut">
-              <a:t>9/18/19</a:t>
+              <a:t>9/17/20</a:t>
             </a:fld>
             <a:endParaRPr lang="en-US"/>
           </a:p>
@@ -3215,7 +3311,7 @@
           <p:cNvPr id="5" name="Footer Placeholder 4">
             <a:extLst>
               <a:ext uri="{FF2B5EF4-FFF2-40B4-BE49-F238E27FC236}">
-                <a16:creationId xmlns:a16="http://schemas.microsoft.com/office/drawing/2014/main" xmlns="" id="{6195C880-FC9B-DF45-B218-AB6096F9BD3A}"/>
+                <a16:creationId xmlns:a16="http://schemas.microsoft.com/office/drawing/2014/main" id="{6195C880-FC9B-DF45-B218-AB6096F9BD3A}"/>
               </a:ext>
             </a:extLst>
           </p:cNvPr>
@@ -3240,7 +3336,7 @@
           <p:cNvPr id="6" name="Slide Number Placeholder 5">
             <a:extLst>
               <a:ext uri="{FF2B5EF4-FFF2-40B4-BE49-F238E27FC236}">
-                <a16:creationId xmlns:a16="http://schemas.microsoft.com/office/drawing/2014/main" xmlns="" id="{7DF2DEC0-DD8C-2146-B2AB-4225AD970FD8}"/>
+                <a16:creationId xmlns:a16="http://schemas.microsoft.com/office/drawing/2014/main" id="{7DF2DEC0-DD8C-2146-B2AB-4225AD970FD8}"/>
               </a:ext>
             </a:extLst>
           </p:cNvPr>
@@ -3298,7 +3394,7 @@
           <p:cNvPr id="2" name="Title 1">
             <a:extLst>
               <a:ext uri="{FF2B5EF4-FFF2-40B4-BE49-F238E27FC236}">
-                <a16:creationId xmlns:a16="http://schemas.microsoft.com/office/drawing/2014/main" xmlns="" id="{9AAA7966-6A9E-BB47-B0D5-022A8BFFFE1A}"/>
+                <a16:creationId xmlns:a16="http://schemas.microsoft.com/office/drawing/2014/main" id="{9AAA7966-6A9E-BB47-B0D5-022A8BFFFE1A}"/>
               </a:ext>
             </a:extLst>
           </p:cNvPr>
@@ -3326,7 +3422,7 @@
           <p:cNvPr id="3" name="Content Placeholder 2">
             <a:extLst>
               <a:ext uri="{FF2B5EF4-FFF2-40B4-BE49-F238E27FC236}">
-                <a16:creationId xmlns:a16="http://schemas.microsoft.com/office/drawing/2014/main" xmlns="" id="{4F0E63D0-B606-D045-9BC7-8A7C4FBD8B97}"/>
+                <a16:creationId xmlns:a16="http://schemas.microsoft.com/office/drawing/2014/main" id="{4F0E63D0-B606-D045-9BC7-8A7C4FBD8B97}"/>
               </a:ext>
             </a:extLst>
           </p:cNvPr>
@@ -3388,7 +3484,7 @@
           <p:cNvPr id="4" name="Content Placeholder 3">
             <a:extLst>
               <a:ext uri="{FF2B5EF4-FFF2-40B4-BE49-F238E27FC236}">
-                <a16:creationId xmlns:a16="http://schemas.microsoft.com/office/drawing/2014/main" xmlns="" id="{EE0A7184-08BF-6946-A73B-46C8EEEF840F}"/>
+                <a16:creationId xmlns:a16="http://schemas.microsoft.com/office/drawing/2014/main" id="{EE0A7184-08BF-6946-A73B-46C8EEEF840F}"/>
               </a:ext>
             </a:extLst>
           </p:cNvPr>
@@ -3450,7 +3546,7 @@
           <p:cNvPr id="5" name="Date Placeholder 4">
             <a:extLst>
               <a:ext uri="{FF2B5EF4-FFF2-40B4-BE49-F238E27FC236}">
-                <a16:creationId xmlns:a16="http://schemas.microsoft.com/office/drawing/2014/main" xmlns="" id="{41CC4CD5-DF04-CB4A-B452-8CF8F7484791}"/>
+                <a16:creationId xmlns:a16="http://schemas.microsoft.com/office/drawing/2014/main" id="{41CC4CD5-DF04-CB4A-B452-8CF8F7484791}"/>
               </a:ext>
             </a:extLst>
           </p:cNvPr>
@@ -3467,7 +3563,7 @@
           <a:lstStyle/>
           <a:p>
             <a:fld id="{6B939D22-5EF9-9546-AAFA-1A29548E4F74}" type="datetimeFigureOut">
-              <a:t>9/18/19</a:t>
+              <a:t>9/17/20</a:t>
             </a:fld>
             <a:endParaRPr lang="en-US"/>
           </a:p>
@@ -3478,7 +3574,7 @@
           <p:cNvPr id="6" name="Footer Placeholder 5">
             <a:extLst>
               <a:ext uri="{FF2B5EF4-FFF2-40B4-BE49-F238E27FC236}">
-                <a16:creationId xmlns:a16="http://schemas.microsoft.com/office/drawing/2014/main" xmlns="" id="{EB7EE44C-8245-FC4A-8644-B0BC387B06C4}"/>
+                <a16:creationId xmlns:a16="http://schemas.microsoft.com/office/drawing/2014/main" id="{EB7EE44C-8245-FC4A-8644-B0BC387B06C4}"/>
               </a:ext>
             </a:extLst>
           </p:cNvPr>
@@ -3503,7 +3599,7 @@
           <p:cNvPr id="7" name="Slide Number Placeholder 6">
             <a:extLst>
               <a:ext uri="{FF2B5EF4-FFF2-40B4-BE49-F238E27FC236}">
-                <a16:creationId xmlns:a16="http://schemas.microsoft.com/office/drawing/2014/main" xmlns="" id="{E67292A2-044B-F74F-AE51-9A0763307077}"/>
+                <a16:creationId xmlns:a16="http://schemas.microsoft.com/office/drawing/2014/main" id="{E67292A2-044B-F74F-AE51-9A0763307077}"/>
               </a:ext>
             </a:extLst>
           </p:cNvPr>
@@ -3561,7 +3657,7 @@
           <p:cNvPr id="2" name="Title 1">
             <a:extLst>
               <a:ext uri="{FF2B5EF4-FFF2-40B4-BE49-F238E27FC236}">
-                <a16:creationId xmlns:a16="http://schemas.microsoft.com/office/drawing/2014/main" xmlns="" id="{4F877B23-7D5B-114B-977D-FF95CB19C58A}"/>
+                <a16:creationId xmlns:a16="http://schemas.microsoft.com/office/drawing/2014/main" id="{4F877B23-7D5B-114B-977D-FF95CB19C58A}"/>
               </a:ext>
             </a:extLst>
           </p:cNvPr>
@@ -3594,7 +3690,7 @@
           <p:cNvPr id="3" name="Text Placeholder 2">
             <a:extLst>
               <a:ext uri="{FF2B5EF4-FFF2-40B4-BE49-F238E27FC236}">
-                <a16:creationId xmlns:a16="http://schemas.microsoft.com/office/drawing/2014/main" xmlns="" id="{8EF2F6F6-0712-0C44-AFE9-CF79B5C7F8BE}"/>
+                <a16:creationId xmlns:a16="http://schemas.microsoft.com/office/drawing/2014/main" id="{8EF2F6F6-0712-0C44-AFE9-CF79B5C7F8BE}"/>
               </a:ext>
             </a:extLst>
           </p:cNvPr>
@@ -3665,7 +3761,7 @@
           <p:cNvPr id="4" name="Content Placeholder 3">
             <a:extLst>
               <a:ext uri="{FF2B5EF4-FFF2-40B4-BE49-F238E27FC236}">
-                <a16:creationId xmlns:a16="http://schemas.microsoft.com/office/drawing/2014/main" xmlns="" id="{8F1234FE-C8EB-F346-9041-D1F62ADB59A8}"/>
+                <a16:creationId xmlns:a16="http://schemas.microsoft.com/office/drawing/2014/main" id="{8F1234FE-C8EB-F346-9041-D1F62ADB59A8}"/>
               </a:ext>
             </a:extLst>
           </p:cNvPr>
@@ -3727,7 +3823,7 @@
           <p:cNvPr id="5" name="Text Placeholder 4">
             <a:extLst>
               <a:ext uri="{FF2B5EF4-FFF2-40B4-BE49-F238E27FC236}">
-                <a16:creationId xmlns:a16="http://schemas.microsoft.com/office/drawing/2014/main" xmlns="" id="{C8059DA7-8B0B-004E-BE37-608303523CE6}"/>
+                <a16:creationId xmlns:a16="http://schemas.microsoft.com/office/drawing/2014/main" id="{C8059DA7-8B0B-004E-BE37-608303523CE6}"/>
               </a:ext>
             </a:extLst>
           </p:cNvPr>
@@ -3798,7 +3894,7 @@
           <p:cNvPr id="6" name="Content Placeholder 5">
             <a:extLst>
               <a:ext uri="{FF2B5EF4-FFF2-40B4-BE49-F238E27FC236}">
-                <a16:creationId xmlns:a16="http://schemas.microsoft.com/office/drawing/2014/main" xmlns="" id="{4DC0F461-4073-C248-A264-29ACEA19F3C2}"/>
+                <a16:creationId xmlns:a16="http://schemas.microsoft.com/office/drawing/2014/main" id="{4DC0F461-4073-C248-A264-29ACEA19F3C2}"/>
               </a:ext>
             </a:extLst>
           </p:cNvPr>
@@ -3860,7 +3956,7 @@
           <p:cNvPr id="7" name="Date Placeholder 6">
             <a:extLst>
               <a:ext uri="{FF2B5EF4-FFF2-40B4-BE49-F238E27FC236}">
-                <a16:creationId xmlns:a16="http://schemas.microsoft.com/office/drawing/2014/main" xmlns="" id="{F36C98B1-9C5F-0848-8498-B25F76B8790C}"/>
+                <a16:creationId xmlns:a16="http://schemas.microsoft.com/office/drawing/2014/main" id="{F36C98B1-9C5F-0848-8498-B25F76B8790C}"/>
               </a:ext>
             </a:extLst>
           </p:cNvPr>
@@ -3877,7 +3973,7 @@
           <a:lstStyle/>
           <a:p>
             <a:fld id="{6B939D22-5EF9-9546-AAFA-1A29548E4F74}" type="datetimeFigureOut">
-              <a:t>9/18/19</a:t>
+              <a:t>9/17/20</a:t>
             </a:fld>
             <a:endParaRPr lang="en-US"/>
           </a:p>
@@ -3888,7 +3984,7 @@
           <p:cNvPr id="8" name="Footer Placeholder 7">
             <a:extLst>
               <a:ext uri="{FF2B5EF4-FFF2-40B4-BE49-F238E27FC236}">
-                <a16:creationId xmlns:a16="http://schemas.microsoft.com/office/drawing/2014/main" xmlns="" id="{C5B9C569-C952-5B46-966A-B8B2841ADC6A}"/>
+                <a16:creationId xmlns:a16="http://schemas.microsoft.com/office/drawing/2014/main" id="{C5B9C569-C952-5B46-966A-B8B2841ADC6A}"/>
               </a:ext>
             </a:extLst>
           </p:cNvPr>
@@ -3913,7 +4009,7 @@
           <p:cNvPr id="9" name="Slide Number Placeholder 8">
             <a:extLst>
               <a:ext uri="{FF2B5EF4-FFF2-40B4-BE49-F238E27FC236}">
-                <a16:creationId xmlns:a16="http://schemas.microsoft.com/office/drawing/2014/main" xmlns="" id="{5D608B8F-C05C-F74F-A75E-DEDD8185DB81}"/>
+                <a16:creationId xmlns:a16="http://schemas.microsoft.com/office/drawing/2014/main" id="{5D608B8F-C05C-F74F-A75E-DEDD8185DB81}"/>
               </a:ext>
             </a:extLst>
           </p:cNvPr>
@@ -3971,7 +4067,7 @@
           <p:cNvPr id="2" name="Title 1">
             <a:extLst>
               <a:ext uri="{FF2B5EF4-FFF2-40B4-BE49-F238E27FC236}">
-                <a16:creationId xmlns:a16="http://schemas.microsoft.com/office/drawing/2014/main" xmlns="" id="{0815BAF5-88D0-1B4E-B9D7-181B7AB37D58}"/>
+                <a16:creationId xmlns:a16="http://schemas.microsoft.com/office/drawing/2014/main" id="{0815BAF5-88D0-1B4E-B9D7-181B7AB37D58}"/>
               </a:ext>
             </a:extLst>
           </p:cNvPr>
@@ -3999,7 +4095,7 @@
           <p:cNvPr id="3" name="Date Placeholder 2">
             <a:extLst>
               <a:ext uri="{FF2B5EF4-FFF2-40B4-BE49-F238E27FC236}">
-                <a16:creationId xmlns:a16="http://schemas.microsoft.com/office/drawing/2014/main" xmlns="" id="{1CDBA150-C058-EA41-A2DE-47777EE4AF67}"/>
+                <a16:creationId xmlns:a16="http://schemas.microsoft.com/office/drawing/2014/main" id="{1CDBA150-C058-EA41-A2DE-47777EE4AF67}"/>
               </a:ext>
             </a:extLst>
           </p:cNvPr>
@@ -4016,7 +4112,7 @@
           <a:lstStyle/>
           <a:p>
             <a:fld id="{6B939D22-5EF9-9546-AAFA-1A29548E4F74}" type="datetimeFigureOut">
-              <a:t>9/18/19</a:t>
+              <a:t>9/17/20</a:t>
             </a:fld>
             <a:endParaRPr lang="en-US"/>
           </a:p>
@@ -4027,7 +4123,7 @@
           <p:cNvPr id="4" name="Footer Placeholder 3">
             <a:extLst>
               <a:ext uri="{FF2B5EF4-FFF2-40B4-BE49-F238E27FC236}">
-                <a16:creationId xmlns:a16="http://schemas.microsoft.com/office/drawing/2014/main" xmlns="" id="{E4C23133-E357-C547-B6C0-7BFD2E77C3DF}"/>
+                <a16:creationId xmlns:a16="http://schemas.microsoft.com/office/drawing/2014/main" id="{E4C23133-E357-C547-B6C0-7BFD2E77C3DF}"/>
               </a:ext>
             </a:extLst>
           </p:cNvPr>
@@ -4052,7 +4148,7 @@
           <p:cNvPr id="5" name="Slide Number Placeholder 4">
             <a:extLst>
               <a:ext uri="{FF2B5EF4-FFF2-40B4-BE49-F238E27FC236}">
-                <a16:creationId xmlns:a16="http://schemas.microsoft.com/office/drawing/2014/main" xmlns="" id="{4A015D96-FA65-4A4F-9C6E-70F6CC0E2569}"/>
+                <a16:creationId xmlns:a16="http://schemas.microsoft.com/office/drawing/2014/main" id="{4A015D96-FA65-4A4F-9C6E-70F6CC0E2569}"/>
               </a:ext>
             </a:extLst>
           </p:cNvPr>
@@ -4110,7 +4206,7 @@
           <p:cNvPr id="2" name="Date Placeholder 1">
             <a:extLst>
               <a:ext uri="{FF2B5EF4-FFF2-40B4-BE49-F238E27FC236}">
-                <a16:creationId xmlns:a16="http://schemas.microsoft.com/office/drawing/2014/main" xmlns="" id="{09B82D3E-3BC4-8C45-A0CC-C0F7A2D99714}"/>
+                <a16:creationId xmlns:a16="http://schemas.microsoft.com/office/drawing/2014/main" id="{09B82D3E-3BC4-8C45-A0CC-C0F7A2D99714}"/>
               </a:ext>
             </a:extLst>
           </p:cNvPr>
@@ -4127,7 +4223,7 @@
           <a:lstStyle/>
           <a:p>
             <a:fld id="{6B939D22-5EF9-9546-AAFA-1A29548E4F74}" type="datetimeFigureOut">
-              <a:t>9/18/19</a:t>
+              <a:t>9/17/20</a:t>
             </a:fld>
             <a:endParaRPr lang="en-US"/>
           </a:p>
@@ -4138,7 +4234,7 @@
           <p:cNvPr id="3" name="Footer Placeholder 2">
             <a:extLst>
               <a:ext uri="{FF2B5EF4-FFF2-40B4-BE49-F238E27FC236}">
-                <a16:creationId xmlns:a16="http://schemas.microsoft.com/office/drawing/2014/main" xmlns="" id="{11140ADA-5463-6741-9388-4CBC8AEE292B}"/>
+                <a16:creationId xmlns:a16="http://schemas.microsoft.com/office/drawing/2014/main" id="{11140ADA-5463-6741-9388-4CBC8AEE292B}"/>
               </a:ext>
             </a:extLst>
           </p:cNvPr>
@@ -4163,7 +4259,7 @@
           <p:cNvPr id="4" name="Slide Number Placeholder 3">
             <a:extLst>
               <a:ext uri="{FF2B5EF4-FFF2-40B4-BE49-F238E27FC236}">
-                <a16:creationId xmlns:a16="http://schemas.microsoft.com/office/drawing/2014/main" xmlns="" id="{127D47FC-D29D-314C-A619-689821FA652C}"/>
+                <a16:creationId xmlns:a16="http://schemas.microsoft.com/office/drawing/2014/main" id="{127D47FC-D29D-314C-A619-689821FA652C}"/>
               </a:ext>
             </a:extLst>
           </p:cNvPr>
@@ -4221,7 +4317,7 @@
           <p:cNvPr id="2" name="Title 1">
             <a:extLst>
               <a:ext uri="{FF2B5EF4-FFF2-40B4-BE49-F238E27FC236}">
-                <a16:creationId xmlns:a16="http://schemas.microsoft.com/office/drawing/2014/main" xmlns="" id="{DF12A72C-08AA-664F-A164-4B0C154F3324}"/>
+                <a16:creationId xmlns:a16="http://schemas.microsoft.com/office/drawing/2014/main" id="{DF12A72C-08AA-664F-A164-4B0C154F3324}"/>
               </a:ext>
             </a:extLst>
           </p:cNvPr>
@@ -4258,7 +4354,7 @@
           <p:cNvPr id="3" name="Content Placeholder 2">
             <a:extLst>
               <a:ext uri="{FF2B5EF4-FFF2-40B4-BE49-F238E27FC236}">
-                <a16:creationId xmlns:a16="http://schemas.microsoft.com/office/drawing/2014/main" xmlns="" id="{9A3294DA-9248-6946-89BB-9B4A307D5B9A}"/>
+                <a16:creationId xmlns:a16="http://schemas.microsoft.com/office/drawing/2014/main" id="{9A3294DA-9248-6946-89BB-9B4A307D5B9A}"/>
               </a:ext>
             </a:extLst>
           </p:cNvPr>
@@ -4348,7 +4444,7 @@
           <p:cNvPr id="4" name="Text Placeholder 3">
             <a:extLst>
               <a:ext uri="{FF2B5EF4-FFF2-40B4-BE49-F238E27FC236}">
-                <a16:creationId xmlns:a16="http://schemas.microsoft.com/office/drawing/2014/main" xmlns="" id="{841B0514-EE3D-3140-82DA-235DC7B9F1C5}"/>
+                <a16:creationId xmlns:a16="http://schemas.microsoft.com/office/drawing/2014/main" id="{841B0514-EE3D-3140-82DA-235DC7B9F1C5}"/>
               </a:ext>
             </a:extLst>
           </p:cNvPr>
@@ -4419,7 +4515,7 @@
           <p:cNvPr id="5" name="Date Placeholder 4">
             <a:extLst>
               <a:ext uri="{FF2B5EF4-FFF2-40B4-BE49-F238E27FC236}">
-                <a16:creationId xmlns:a16="http://schemas.microsoft.com/office/drawing/2014/main" xmlns="" id="{A87C5ED0-B451-FF46-B735-33285D1DA7DA}"/>
+                <a16:creationId xmlns:a16="http://schemas.microsoft.com/office/drawing/2014/main" id="{A87C5ED0-B451-FF46-B735-33285D1DA7DA}"/>
               </a:ext>
             </a:extLst>
           </p:cNvPr>
@@ -4436,7 +4532,7 @@
           <a:lstStyle/>
           <a:p>
             <a:fld id="{6B939D22-5EF9-9546-AAFA-1A29548E4F74}" type="datetimeFigureOut">
-              <a:t>9/18/19</a:t>
+              <a:t>9/17/20</a:t>
             </a:fld>
             <a:endParaRPr lang="en-US"/>
           </a:p>
@@ -4447,7 +4543,7 @@
           <p:cNvPr id="6" name="Footer Placeholder 5">
             <a:extLst>
               <a:ext uri="{FF2B5EF4-FFF2-40B4-BE49-F238E27FC236}">
-                <a16:creationId xmlns:a16="http://schemas.microsoft.com/office/drawing/2014/main" xmlns="" id="{D44FA009-6F34-2542-9265-C618E32023D0}"/>
+                <a16:creationId xmlns:a16="http://schemas.microsoft.com/office/drawing/2014/main" id="{D44FA009-6F34-2542-9265-C618E32023D0}"/>
               </a:ext>
             </a:extLst>
           </p:cNvPr>
@@ -4472,7 +4568,7 @@
           <p:cNvPr id="7" name="Slide Number Placeholder 6">
             <a:extLst>
               <a:ext uri="{FF2B5EF4-FFF2-40B4-BE49-F238E27FC236}">
-                <a16:creationId xmlns:a16="http://schemas.microsoft.com/office/drawing/2014/main" xmlns="" id="{A96A06DB-D25C-2A45-8014-83C3A146EA4D}"/>
+                <a16:creationId xmlns:a16="http://schemas.microsoft.com/office/drawing/2014/main" id="{A96A06DB-D25C-2A45-8014-83C3A146EA4D}"/>
               </a:ext>
             </a:extLst>
           </p:cNvPr>
@@ -4530,7 +4626,7 @@
           <p:cNvPr id="2" name="Title 1">
             <a:extLst>
               <a:ext uri="{FF2B5EF4-FFF2-40B4-BE49-F238E27FC236}">
-                <a16:creationId xmlns:a16="http://schemas.microsoft.com/office/drawing/2014/main" xmlns="" id="{393FFB8D-CD50-DC4C-82B3-D070C1E729A9}"/>
+                <a16:creationId xmlns:a16="http://schemas.microsoft.com/office/drawing/2014/main" id="{393FFB8D-CD50-DC4C-82B3-D070C1E729A9}"/>
               </a:ext>
             </a:extLst>
           </p:cNvPr>
@@ -4567,7 +4663,7 @@
           <p:cNvPr id="3" name="Picture Placeholder 2">
             <a:extLst>
               <a:ext uri="{FF2B5EF4-FFF2-40B4-BE49-F238E27FC236}">
-                <a16:creationId xmlns:a16="http://schemas.microsoft.com/office/drawing/2014/main" xmlns="" id="{DEDC98FB-CE17-F148-8C37-C140BDA9EE4A}"/>
+                <a16:creationId xmlns:a16="http://schemas.microsoft.com/office/drawing/2014/main" id="{DEDC98FB-CE17-F148-8C37-C140BDA9EE4A}"/>
               </a:ext>
             </a:extLst>
           </p:cNvPr>
@@ -4634,7 +4730,7 @@
           <p:cNvPr id="4" name="Text Placeholder 3">
             <a:extLst>
               <a:ext uri="{FF2B5EF4-FFF2-40B4-BE49-F238E27FC236}">
-                <a16:creationId xmlns:a16="http://schemas.microsoft.com/office/drawing/2014/main" xmlns="" id="{06CC15CF-8754-A643-9228-87065AB14604}"/>
+                <a16:creationId xmlns:a16="http://schemas.microsoft.com/office/drawing/2014/main" id="{06CC15CF-8754-A643-9228-87065AB14604}"/>
               </a:ext>
             </a:extLst>
           </p:cNvPr>
@@ -4705,7 +4801,7 @@
           <p:cNvPr id="5" name="Date Placeholder 4">
             <a:extLst>
               <a:ext uri="{FF2B5EF4-FFF2-40B4-BE49-F238E27FC236}">
-                <a16:creationId xmlns:a16="http://schemas.microsoft.com/office/drawing/2014/main" xmlns="" id="{F3B8B5C9-FE70-504D-B355-17395ED08650}"/>
+                <a16:creationId xmlns:a16="http://schemas.microsoft.com/office/drawing/2014/main" id="{F3B8B5C9-FE70-504D-B355-17395ED08650}"/>
               </a:ext>
             </a:extLst>
           </p:cNvPr>
@@ -4722,7 +4818,7 @@
           <a:lstStyle/>
           <a:p>
             <a:fld id="{6B939D22-5EF9-9546-AAFA-1A29548E4F74}" type="datetimeFigureOut">
-              <a:t>9/18/19</a:t>
+              <a:t>9/17/20</a:t>
             </a:fld>
             <a:endParaRPr lang="en-US"/>
           </a:p>
@@ -4733,7 +4829,7 @@
           <p:cNvPr id="6" name="Footer Placeholder 5">
             <a:extLst>
               <a:ext uri="{FF2B5EF4-FFF2-40B4-BE49-F238E27FC236}">
-                <a16:creationId xmlns:a16="http://schemas.microsoft.com/office/drawing/2014/main" xmlns="" id="{7F530C92-7011-3643-89B6-B662EA026913}"/>
+                <a16:creationId xmlns:a16="http://schemas.microsoft.com/office/drawing/2014/main" id="{7F530C92-7011-3643-89B6-B662EA026913}"/>
               </a:ext>
             </a:extLst>
           </p:cNvPr>
@@ -4758,7 +4854,7 @@
           <p:cNvPr id="7" name="Slide Number Placeholder 6">
             <a:extLst>
               <a:ext uri="{FF2B5EF4-FFF2-40B4-BE49-F238E27FC236}">
-                <a16:creationId xmlns:a16="http://schemas.microsoft.com/office/drawing/2014/main" xmlns="" id="{D99BEA92-5B64-E14E-8F26-49762A043698}"/>
+                <a16:creationId xmlns:a16="http://schemas.microsoft.com/office/drawing/2014/main" id="{D99BEA92-5B64-E14E-8F26-49762A043698}"/>
               </a:ext>
             </a:extLst>
           </p:cNvPr>
@@ -4821,7 +4917,7 @@
           <p:cNvPr id="2" name="Title Placeholder 1">
             <a:extLst>
               <a:ext uri="{FF2B5EF4-FFF2-40B4-BE49-F238E27FC236}">
-                <a16:creationId xmlns:a16="http://schemas.microsoft.com/office/drawing/2014/main" xmlns="" id="{5090644D-4FE3-4D42-9EDB-76E7ECAFBD54}"/>
+                <a16:creationId xmlns:a16="http://schemas.microsoft.com/office/drawing/2014/main" id="{5090644D-4FE3-4D42-9EDB-76E7ECAFBD54}"/>
               </a:ext>
             </a:extLst>
           </p:cNvPr>
@@ -4859,7 +4955,7 @@
           <p:cNvPr id="3" name="Text Placeholder 2">
             <a:extLst>
               <a:ext uri="{FF2B5EF4-FFF2-40B4-BE49-F238E27FC236}">
-                <a16:creationId xmlns:a16="http://schemas.microsoft.com/office/drawing/2014/main" xmlns="" id="{0FCC6A28-9443-C249-B752-70E534D590A9}"/>
+                <a16:creationId xmlns:a16="http://schemas.microsoft.com/office/drawing/2014/main" id="{0FCC6A28-9443-C249-B752-70E534D590A9}"/>
               </a:ext>
             </a:extLst>
           </p:cNvPr>
@@ -4926,7 +5022,7 @@
           <p:cNvPr id="4" name="Date Placeholder 3">
             <a:extLst>
               <a:ext uri="{FF2B5EF4-FFF2-40B4-BE49-F238E27FC236}">
-                <a16:creationId xmlns:a16="http://schemas.microsoft.com/office/drawing/2014/main" xmlns="" id="{1BED9CED-0862-0947-85E3-16D1ABDB4C90}"/>
+                <a16:creationId xmlns:a16="http://schemas.microsoft.com/office/drawing/2014/main" id="{1BED9CED-0862-0947-85E3-16D1ABDB4C90}"/>
               </a:ext>
             </a:extLst>
           </p:cNvPr>
@@ -4961,7 +5057,7 @@
           </a:lstStyle>
           <a:p>
             <a:fld id="{6B939D22-5EF9-9546-AAFA-1A29548E4F74}" type="datetimeFigureOut">
-              <a:t>9/18/19</a:t>
+              <a:t>9/17/20</a:t>
             </a:fld>
             <a:endParaRPr lang="en-US"/>
           </a:p>
@@ -4972,7 +5068,7 @@
           <p:cNvPr id="5" name="Footer Placeholder 4">
             <a:extLst>
               <a:ext uri="{FF2B5EF4-FFF2-40B4-BE49-F238E27FC236}">
-                <a16:creationId xmlns:a16="http://schemas.microsoft.com/office/drawing/2014/main" xmlns="" id="{CADF948B-9408-DF4C-B7D2-87868BF613FC}"/>
+                <a16:creationId xmlns:a16="http://schemas.microsoft.com/office/drawing/2014/main" id="{CADF948B-9408-DF4C-B7D2-87868BF613FC}"/>
               </a:ext>
             </a:extLst>
           </p:cNvPr>
@@ -5015,7 +5111,7 @@
           <p:cNvPr id="6" name="Slide Number Placeholder 5">
             <a:extLst>
               <a:ext uri="{FF2B5EF4-FFF2-40B4-BE49-F238E27FC236}">
-                <a16:creationId xmlns:a16="http://schemas.microsoft.com/office/drawing/2014/main" xmlns="" id="{29E72953-A870-6D4D-A07C-4349679D67DD}"/>
+                <a16:creationId xmlns:a16="http://schemas.microsoft.com/office/drawing/2014/main" id="{29E72953-A870-6D4D-A07C-4349679D67DD}"/>
               </a:ext>
             </a:extLst>
           </p:cNvPr>
@@ -5382,7 +5478,7 @@
           <p:cNvPr id="2" name="Title 1">
             <a:extLst>
               <a:ext uri="{FF2B5EF4-FFF2-40B4-BE49-F238E27FC236}">
-                <a16:creationId xmlns:a16="http://schemas.microsoft.com/office/drawing/2014/main" xmlns="" id="{2194B3CD-A195-6145-A136-A424087C109E}"/>
+                <a16:creationId xmlns:a16="http://schemas.microsoft.com/office/drawing/2014/main" id="{2194B3CD-A195-6145-A136-A424087C109E}"/>
               </a:ext>
             </a:extLst>
           </p:cNvPr>
@@ -6010,11 +6106,7 @@
             </a:r>
             <a:r>
               <a:rPr lang="en-US"/>
-              <a:t>	</a:t>
-            </a:r>
-            <a:r>
-              <a:rPr lang="en-US" smtClean="0"/>
-              <a:t>1</a:t>
+              <a:t>	1</a:t>
             </a:r>
             <a:r>
               <a:rPr lang="en-US" dirty="0"/>
@@ -6022,11 +6114,7 @@
             </a:r>
             <a:r>
               <a:rPr lang="en-US"/>
-              <a:t>	</a:t>
-            </a:r>
-            <a:r>
-              <a:rPr lang="en-US" smtClean="0"/>
-              <a:t>-1 </a:t>
+              <a:t>	-1 </a:t>
             </a:r>
             <a:r>
               <a:rPr lang="en-US" dirty="0"/>
@@ -6155,6 +6243,20 @@
               <a:t>Any problems or questions that this raises?</a:t>
             </a:r>
           </a:p>
+          <a:p>
+            <a:endParaRPr lang="en-US" dirty="0"/>
+          </a:p>
+          <a:p>
+            <a:r>
+              <a:rPr lang="en-US" dirty="0"/>
+              <a:t>In </a:t>
+            </a:r>
+            <a:r>
+              <a:rPr lang="en-US"/>
+              <a:t>breakout rooms or pairs</a:t>
+            </a:r>
+            <a:endParaRPr lang="en-US" dirty="0"/>
+          </a:p>
         </p:txBody>
       </p:sp>
     </p:spTree>
@@ -6515,41 +6617,29 @@
       </p:sp>
       <p:sp>
         <p:nvSpPr>
-          <p:cNvPr id="4" name="Title 1"/>
-          <p:cNvSpPr txBox="1">
-            <a:spLocks/>
-          </p:cNvSpPr>
-          <p:nvPr/>
+          <p:cNvPr id="5" name="Title 1">
+            <a:extLst>
+              <a:ext uri="{FF2B5EF4-FFF2-40B4-BE49-F238E27FC236}">
+                <a16:creationId xmlns:a16="http://schemas.microsoft.com/office/drawing/2014/main" id="{8BD80CDC-08A3-E341-8883-080FE173B3F1}"/>
+              </a:ext>
+            </a:extLst>
+          </p:cNvPr>
+          <p:cNvSpPr>
+            <a:spLocks noGrp="1"/>
+          </p:cNvSpPr>
+          <p:nvPr>
+            <p:ph type="title"/>
+          </p:nvPr>
         </p:nvSpPr>
         <p:spPr>
           <a:xfrm>
-            <a:off x="2133600" y="427038"/>
-            <a:ext cx="8229600" cy="1143000"/>
+            <a:off x="838200" y="365125"/>
+            <a:ext cx="10515600" cy="1325563"/>
           </a:xfrm>
-          <a:prstGeom prst="rect">
-            <a:avLst/>
-          </a:prstGeom>
         </p:spPr>
         <p:txBody>
-          <a:bodyPr vert="horz" lIns="91440" tIns="45720" rIns="91440" bIns="45720" rtlCol="0" anchor="ctr">
-            <a:normAutofit/>
-          </a:bodyPr>
-          <a:lstStyle>
-            <a:lvl1pPr algn="ctr" defTabSz="457200" rtl="0" eaLnBrk="1" latinLnBrk="0" hangingPunct="1">
-              <a:spcBef>
-                <a:spcPct val="0"/>
-              </a:spcBef>
-              <a:buNone/>
-              <a:defRPr sz="4400" kern="1200">
-                <a:solidFill>
-                  <a:schemeClr val="tx1"/>
-                </a:solidFill>
-                <a:latin typeface="+mj-lt"/>
-                <a:ea typeface="+mj-ea"/>
-                <a:cs typeface="+mj-cs"/>
-              </a:defRPr>
-            </a:lvl1pPr>
-          </a:lstStyle>
+          <a:bodyPr/>
+          <a:lstStyle/>
           <a:p>
             <a:r>
               <a:rPr lang="en-US" dirty="0"/>
@@ -6593,7 +6683,7 @@
           <p:cNvPr id="2" name="Title 1">
             <a:extLst>
               <a:ext uri="{FF2B5EF4-FFF2-40B4-BE49-F238E27FC236}">
-                <a16:creationId xmlns:a16="http://schemas.microsoft.com/office/drawing/2014/main" xmlns="" id="{746AE940-B64B-3C44-A159-BF5C5462B4B0}"/>
+                <a16:creationId xmlns:a16="http://schemas.microsoft.com/office/drawing/2014/main" id="{746AE940-B64B-3C44-A159-BF5C5462B4B0}"/>
               </a:ext>
             </a:extLst>
           </p:cNvPr>
@@ -6621,7 +6711,7 @@
           <p:cNvPr id="3" name="Content Placeholder 2">
             <a:extLst>
               <a:ext uri="{FF2B5EF4-FFF2-40B4-BE49-F238E27FC236}">
-                <a16:creationId xmlns:a16="http://schemas.microsoft.com/office/drawing/2014/main" xmlns="" id="{73AB9B70-C367-2044-BBEB-33A895F06D69}"/>
+                <a16:creationId xmlns:a16="http://schemas.microsoft.com/office/drawing/2014/main" id="{73AB9B70-C367-2044-BBEB-33A895F06D69}"/>
               </a:ext>
             </a:extLst>
           </p:cNvPr>
@@ -6843,7 +6933,7 @@
           <p:cNvPr id="2" name="Title 1">
             <a:extLst>
               <a:ext uri="{FF2B5EF4-FFF2-40B4-BE49-F238E27FC236}">
-                <a16:creationId xmlns:a16="http://schemas.microsoft.com/office/drawing/2014/main" xmlns="" id="{D127F0A7-ED78-5F4A-AB40-E5E81442BFB6}"/>
+                <a16:creationId xmlns:a16="http://schemas.microsoft.com/office/drawing/2014/main" id="{D127F0A7-ED78-5F4A-AB40-E5E81442BFB6}"/>
               </a:ext>
             </a:extLst>
           </p:cNvPr>
@@ -6871,7 +6961,7 @@
           <p:cNvPr id="3" name="Content Placeholder 2">
             <a:extLst>
               <a:ext uri="{FF2B5EF4-FFF2-40B4-BE49-F238E27FC236}">
-                <a16:creationId xmlns:a16="http://schemas.microsoft.com/office/drawing/2014/main" xmlns="" id="{AD12C321-5B80-D843-85F3-BC9F939301CC}"/>
+                <a16:creationId xmlns:a16="http://schemas.microsoft.com/office/drawing/2014/main" id="{AD12C321-5B80-D843-85F3-BC9F939301CC}"/>
               </a:ext>
             </a:extLst>
           </p:cNvPr>
@@ -6941,7 +7031,7 @@
           <p:cNvPr id="2" name="Title 1">
             <a:extLst>
               <a:ext uri="{FF2B5EF4-FFF2-40B4-BE49-F238E27FC236}">
-                <a16:creationId xmlns:a16="http://schemas.microsoft.com/office/drawing/2014/main" xmlns="" id="{D127F0A7-ED78-5F4A-AB40-E5E81442BFB6}"/>
+                <a16:creationId xmlns:a16="http://schemas.microsoft.com/office/drawing/2014/main" id="{D127F0A7-ED78-5F4A-AB40-E5E81442BFB6}"/>
               </a:ext>
             </a:extLst>
           </p:cNvPr>
@@ -6969,7 +7059,7 @@
           <p:cNvPr id="3" name="Content Placeholder 2">
             <a:extLst>
               <a:ext uri="{FF2B5EF4-FFF2-40B4-BE49-F238E27FC236}">
-                <a16:creationId xmlns:a16="http://schemas.microsoft.com/office/drawing/2014/main" xmlns="" id="{AD12C321-5B80-D843-85F3-BC9F939301CC}"/>
+                <a16:creationId xmlns:a16="http://schemas.microsoft.com/office/drawing/2014/main" id="{AD12C321-5B80-D843-85F3-BC9F939301CC}"/>
               </a:ext>
             </a:extLst>
           </p:cNvPr>
@@ -7051,7 +7141,7 @@
           <p:cNvPr id="2" name="Title 1">
             <a:extLst>
               <a:ext uri="{FF2B5EF4-FFF2-40B4-BE49-F238E27FC236}">
-                <a16:creationId xmlns:a16="http://schemas.microsoft.com/office/drawing/2014/main" xmlns="" id="{719E81A8-FF1B-C345-AA4A-46946395F229}"/>
+                <a16:creationId xmlns:a16="http://schemas.microsoft.com/office/drawing/2014/main" id="{719E81A8-FF1B-C345-AA4A-46946395F229}"/>
               </a:ext>
             </a:extLst>
           </p:cNvPr>
@@ -7079,7 +7169,7 @@
           <p:cNvPr id="3" name="Content Placeholder 2">
             <a:extLst>
               <a:ext uri="{FF2B5EF4-FFF2-40B4-BE49-F238E27FC236}">
-                <a16:creationId xmlns:a16="http://schemas.microsoft.com/office/drawing/2014/main" xmlns="" id="{93BADEA3-2F02-1346-BCCA-17D92A5B3C67}"/>
+                <a16:creationId xmlns:a16="http://schemas.microsoft.com/office/drawing/2014/main" id="{93BADEA3-2F02-1346-BCCA-17D92A5B3C67}"/>
               </a:ext>
             </a:extLst>
           </p:cNvPr>
@@ -7096,32 +7186,46 @@
           <a:lstStyle/>
           <a:p>
             <a:r>
-              <a:rPr lang="en-US"/>
-              <a:t>Due Week of October 15th</a:t>
-            </a:r>
-          </a:p>
-          <a:p>
-            <a:r>
-              <a:rPr lang="en-US"/>
-              <a:t>Develop a low-tech, pencil and paper (ish) digital humanities workshop you could give soon based on your research interests.</a:t>
-            </a:r>
-          </a:p>
-          <a:p>
-            <a:r>
-              <a:rPr lang="en-US"/>
+              <a:rPr lang="en-US" dirty="0"/>
+              <a:t>Due Week of October 20th</a:t>
+            </a:r>
+          </a:p>
+          <a:p>
+            <a:r>
+              <a:rPr lang="en-US" dirty="0"/>
+              <a:t>Develop a low-tech, pencil and paper (</a:t>
+            </a:r>
+            <a:r>
+              <a:rPr lang="en-US" dirty="0" err="1"/>
+              <a:t>ish</a:t>
+            </a:r>
+            <a:r>
+              <a:rPr lang="en-US" dirty="0"/>
+              <a:t>) digital humanities workshop you could give soon based on your research interests.</a:t>
+            </a:r>
+          </a:p>
+          <a:p>
+            <a:r>
+              <a:rPr lang="en-US" dirty="0"/>
               <a:t>Use it as an opportunity to teach to learn.</a:t>
             </a:r>
           </a:p>
           <a:p>
             <a:r>
-              <a:rPr lang="en-US"/>
-              <a:t>Be thinking of the Equity Atlas.</a:t>
-            </a:r>
-          </a:p>
-          <a:p>
-            <a:r>
-              <a:rPr lang="en-US"/>
+              <a:rPr lang="en-US" dirty="0"/>
+              <a:t>Be thinking of the how this connects to the project.</a:t>
+            </a:r>
+          </a:p>
+          <a:p>
+            <a:r>
+              <a:rPr lang="en-US" dirty="0"/>
               <a:t>Work with others on your ideas</a:t>
+            </a:r>
+          </a:p>
+          <a:p>
+            <a:r>
+              <a:rPr lang="en-US" dirty="0"/>
+              <a:t>Outcome is a blog post</a:t>
             </a:r>
           </a:p>
         </p:txBody>
@@ -7161,7 +7265,7 @@
           <p:cNvPr id="2" name="Title 1">
             <a:extLst>
               <a:ext uri="{FF2B5EF4-FFF2-40B4-BE49-F238E27FC236}">
-                <a16:creationId xmlns:a16="http://schemas.microsoft.com/office/drawing/2014/main" xmlns="" id="{81FF6825-13FF-0D46-8B12-28B652FFF39C}"/>
+                <a16:creationId xmlns:a16="http://schemas.microsoft.com/office/drawing/2014/main" id="{81FF6825-13FF-0D46-8B12-28B652FFF39C}"/>
               </a:ext>
             </a:extLst>
           </p:cNvPr>
@@ -7189,7 +7293,7 @@
           <p:cNvPr id="3" name="Content Placeholder 2">
             <a:extLst>
               <a:ext uri="{FF2B5EF4-FFF2-40B4-BE49-F238E27FC236}">
-                <a16:creationId xmlns:a16="http://schemas.microsoft.com/office/drawing/2014/main" xmlns="" id="{959A19E9-F943-1F48-AA2A-65BAFA3908CF}"/>
+                <a16:creationId xmlns:a16="http://schemas.microsoft.com/office/drawing/2014/main" id="{959A19E9-F943-1F48-AA2A-65BAFA3908CF}"/>
               </a:ext>
             </a:extLst>
           </p:cNvPr>
@@ -7247,7 +7351,7 @@
           <p:cNvPr id="2" name="Title 1">
             <a:extLst>
               <a:ext uri="{FF2B5EF4-FFF2-40B4-BE49-F238E27FC236}">
-                <a16:creationId xmlns:a16="http://schemas.microsoft.com/office/drawing/2014/main" xmlns="" id="{F778836A-906F-E54A-8420-B19EB122E912}"/>
+                <a16:creationId xmlns:a16="http://schemas.microsoft.com/office/drawing/2014/main" id="{F778836A-906F-E54A-8420-B19EB122E912}"/>
               </a:ext>
             </a:extLst>
           </p:cNvPr>
@@ -7275,7 +7379,7 @@
           <p:cNvPr id="3" name="Content Placeholder 2">
             <a:extLst>
               <a:ext uri="{FF2B5EF4-FFF2-40B4-BE49-F238E27FC236}">
-                <a16:creationId xmlns:a16="http://schemas.microsoft.com/office/drawing/2014/main" xmlns="" id="{C959CF34-3B0D-B24F-B1BE-B3F59FD7C982}"/>
+                <a16:creationId xmlns:a16="http://schemas.microsoft.com/office/drawing/2014/main" id="{C959CF34-3B0D-B24F-B1BE-B3F59FD7C982}"/>
               </a:ext>
             </a:extLst>
           </p:cNvPr>
@@ -7292,47 +7396,47 @@
           <a:lstStyle/>
           <a:p>
             <a:r>
-              <a:rPr lang="en-US"/>
+              <a:rPr lang="en-US" dirty="0"/>
               <a:t>Think about what kind of method or concept you want as part of your profile</a:t>
             </a:r>
           </a:p>
           <a:p>
             <a:r>
-              <a:rPr lang="en-US"/>
+              <a:rPr lang="en-US" dirty="0"/>
               <a:t>Think through how it might relate to your own…</a:t>
             </a:r>
           </a:p>
           <a:p>
             <a:pPr lvl="1"/>
             <a:r>
-              <a:rPr lang="en-US"/>
+              <a:rPr lang="en-US" dirty="0"/>
               <a:t>Research</a:t>
             </a:r>
           </a:p>
           <a:p>
             <a:pPr lvl="1"/>
             <a:r>
-              <a:rPr lang="en-US"/>
+              <a:rPr lang="en-US" dirty="0"/>
               <a:t>Workshop</a:t>
             </a:r>
           </a:p>
           <a:p>
             <a:pPr lvl="1"/>
             <a:r>
-              <a:rPr lang="en-US"/>
-              <a:t>Equity Atlas</a:t>
-            </a:r>
-          </a:p>
-          <a:p>
-            <a:r>
-              <a:rPr lang="en-US"/>
+              <a:rPr lang="en-US" dirty="0"/>
+              <a:t>DH Education project</a:t>
+            </a:r>
+          </a:p>
+          <a:p>
+            <a:r>
+              <a:rPr lang="en-US" dirty="0"/>
               <a:t>Start brainstorming workshop ideas. </a:t>
             </a:r>
           </a:p>
           <a:p>
             <a:r>
-              <a:rPr lang="en-US"/>
-              <a:t>Please feel free to talk to me – I can poke you in a direction</a:t>
+              <a:rPr lang="en-US" dirty="0"/>
+              <a:t>Talk to me – I can poke you in a direction</a:t>
             </a:r>
           </a:p>
         </p:txBody>
@@ -7372,7 +7476,7 @@
           <p:cNvPr id="2" name="Title 1">
             <a:extLst>
               <a:ext uri="{FF2B5EF4-FFF2-40B4-BE49-F238E27FC236}">
-                <a16:creationId xmlns:a16="http://schemas.microsoft.com/office/drawing/2014/main" xmlns="" id="{B01FE232-6D60-EC46-A378-6EA2AF648768}"/>
+                <a16:creationId xmlns:a16="http://schemas.microsoft.com/office/drawing/2014/main" id="{17F93419-A0D5-8D4E-A4A8-A72713A004A8}"/>
               </a:ext>
             </a:extLst>
           </p:cNvPr>
@@ -7389,8 +7493,8 @@
           <a:lstStyle/>
           <a:p>
             <a:r>
-              <a:rPr lang="en-US"/>
-              <a:t>Resources</a:t>
+              <a:rPr lang="en-US" dirty="0"/>
+              <a:t>Resources to Get You Started</a:t>
             </a:r>
           </a:p>
         </p:txBody>
@@ -7400,7 +7504,7 @@
           <p:cNvPr id="3" name="Content Placeholder 2">
             <a:extLst>
               <a:ext uri="{FF2B5EF4-FFF2-40B4-BE49-F238E27FC236}">
-                <a16:creationId xmlns:a16="http://schemas.microsoft.com/office/drawing/2014/main" xmlns="" id="{807F739C-40AD-984A-84B7-5CC2AA0A9F48}"/>
+                <a16:creationId xmlns:a16="http://schemas.microsoft.com/office/drawing/2014/main" id="{1332D47B-3688-0F41-A6B8-5D34B70C69C5}"/>
               </a:ext>
             </a:extLst>
           </p:cNvPr>
@@ -7416,40 +7520,187 @@
           <a:bodyPr/>
           <a:lstStyle/>
           <a:p>
-            <a:r>
-              <a:rPr lang="en-US"/>
-              <a:t>Some ways to start your thinking…</a:t>
-            </a:r>
-          </a:p>
-          <a:p>
-            <a:r>
-              <a:rPr lang="en-US"/>
+            <a:pPr fontAlgn="base"/>
+            <a:r>
+              <a:rPr lang="en-US" dirty="0"/>
+              <a:t>Disciplinary DH assignment</a:t>
+            </a:r>
+          </a:p>
+          <a:p>
+            <a:pPr lvl="1" fontAlgn="base"/>
+            <a:r>
+              <a:rPr lang="en-US" dirty="0"/>
+              <a:t>Come in with 3-5 DH projects from your discipline (broadly construed!), some of which connect to your interests for discussion.</a:t>
+            </a:r>
+          </a:p>
+          <a:p>
+            <a:pPr lvl="1" fontAlgn="base"/>
+            <a:r>
+              <a:rPr lang="en-US" dirty="0"/>
+              <a:t>Digital Pedagogy in the Humanities can be a way in for those projects</a:t>
+            </a:r>
+          </a:p>
+          <a:p>
+            <a:pPr lvl="1" fontAlgn="base"/>
+            <a:r>
+              <a:rPr lang="en-US" dirty="0"/>
+              <a:t>I can also help you find things – ping me</a:t>
+            </a:r>
+          </a:p>
+          <a:p>
+            <a:pPr lvl="1" fontAlgn="base"/>
+            <a:r>
+              <a:rPr lang="en-US" dirty="0"/>
+              <a:t>Be prepared to chat about what you find. </a:t>
+            </a:r>
+          </a:p>
+          <a:p>
+            <a:pPr fontAlgn="base"/>
+            <a:r>
+              <a:rPr lang="en-US" dirty="0"/>
+              <a:t>Readings Assigned</a:t>
+            </a:r>
+          </a:p>
+          <a:p>
+            <a:pPr lvl="1" fontAlgn="base"/>
+            <a:r>
+              <a:rPr lang="en-US" dirty="0"/>
+              <a:t>Explore 2-3 things in </a:t>
+            </a:r>
+            <a:r>
+              <a:rPr lang="en-US" dirty="0">
+                <a:hlinkClick r:id="rId2"/>
+              </a:rPr>
+              <a:t>Digital Pedagogy in the Humanities: Concepts, Models, and Experiments</a:t>
+            </a:r>
+            <a:r>
+              <a:rPr lang="en-US" dirty="0"/>
+              <a:t> that are useful for your interests.</a:t>
+            </a:r>
+          </a:p>
+        </p:txBody>
+      </p:sp>
+    </p:spTree>
+    <p:extLst>
+      <p:ext uri="{BB962C8B-B14F-4D97-AF65-F5344CB8AC3E}">
+        <p14:creationId xmlns:p14="http://schemas.microsoft.com/office/powerpoint/2010/main" val="3230573892"/>
+      </p:ext>
+    </p:extLst>
+  </p:cSld>
+  <p:clrMapOvr>
+    <a:masterClrMapping/>
+  </p:clrMapOvr>
+</p:sld>
+</file>
+
+<file path=ppt/slides/slide27.xml><?xml version="1.0" encoding="utf-8"?>
+<p:sld xmlns:a="http://schemas.openxmlformats.org/drawingml/2006/main" xmlns:r="http://schemas.openxmlformats.org/officeDocument/2006/relationships" xmlns:p="http://schemas.openxmlformats.org/presentationml/2006/main">
+  <p:cSld>
+    <p:spTree>
+      <p:nvGrpSpPr>
+        <p:cNvPr id="1" name=""/>
+        <p:cNvGrpSpPr/>
+        <p:nvPr/>
+      </p:nvGrpSpPr>
+      <p:grpSpPr>
+        <a:xfrm>
+          <a:off x="0" y="0"/>
+          <a:ext cx="0" cy="0"/>
+          <a:chOff x="0" y="0"/>
+          <a:chExt cx="0" cy="0"/>
+        </a:xfrm>
+      </p:grpSpPr>
+      <p:sp>
+        <p:nvSpPr>
+          <p:cNvPr id="2" name="Title 1">
+            <a:extLst>
+              <a:ext uri="{FF2B5EF4-FFF2-40B4-BE49-F238E27FC236}">
+                <a16:creationId xmlns:a16="http://schemas.microsoft.com/office/drawing/2014/main" id="{B01FE232-6D60-EC46-A378-6EA2AF648768}"/>
+              </a:ext>
+            </a:extLst>
+          </p:cNvPr>
+          <p:cNvSpPr>
+            <a:spLocks noGrp="1"/>
+          </p:cNvSpPr>
+          <p:nvPr>
+            <p:ph type="title"/>
+          </p:nvPr>
+        </p:nvSpPr>
+        <p:spPr/>
+        <p:txBody>
+          <a:bodyPr/>
+          <a:lstStyle/>
+          <a:p>
+            <a:r>
+              <a:rPr lang="en-US"/>
+              <a:t>Resources</a:t>
+            </a:r>
+          </a:p>
+        </p:txBody>
+      </p:sp>
+      <p:sp>
+        <p:nvSpPr>
+          <p:cNvPr id="3" name="Content Placeholder 2">
+            <a:extLst>
+              <a:ext uri="{FF2B5EF4-FFF2-40B4-BE49-F238E27FC236}">
+                <a16:creationId xmlns:a16="http://schemas.microsoft.com/office/drawing/2014/main" id="{807F739C-40AD-984A-84B7-5CC2AA0A9F48}"/>
+              </a:ext>
+            </a:extLst>
+          </p:cNvPr>
+          <p:cNvSpPr>
+            <a:spLocks noGrp="1"/>
+          </p:cNvSpPr>
+          <p:nvPr>
+            <p:ph idx="1"/>
+          </p:nvPr>
+        </p:nvSpPr>
+        <p:spPr/>
+        <p:txBody>
+          <a:bodyPr/>
+          <a:lstStyle/>
+          <a:p>
+            <a:r>
+              <a:rPr lang="en-US" dirty="0"/>
+              <a:t>Some other ways to start your thinking…</a:t>
+            </a:r>
+          </a:p>
+          <a:p>
+            <a:r>
+              <a:rPr lang="en-US" dirty="0"/>
               <a:t>Keep exploring </a:t>
             </a:r>
             <a:r>
-              <a:rPr lang="en-US" i="1"/>
+              <a:rPr lang="en-US" i="1" dirty="0"/>
               <a:t>Digital Pedagogy in the Humanities</a:t>
             </a:r>
-            <a:endParaRPr lang="en-US"/>
-          </a:p>
-          <a:p>
-            <a:r>
-              <a:rPr lang="en-US"/>
-              <a:t>Pick a lesson from programminghistorian.org to work through that looks interesting</a:t>
-            </a:r>
-          </a:p>
-          <a:p>
-            <a:r>
-              <a:rPr lang="en-US"/>
+            <a:endParaRPr lang="en-US" dirty="0"/>
+          </a:p>
+          <a:p>
+            <a:r>
+              <a:rPr lang="en-US" dirty="0"/>
+              <a:t>Pick a lesson from </a:t>
+            </a:r>
+            <a:r>
+              <a:rPr lang="en-US" dirty="0" err="1"/>
+              <a:t>programminghistorian.org</a:t>
+            </a:r>
+            <a:r>
+              <a:rPr lang="en-US" dirty="0"/>
+              <a:t> to work through that looks interesting</a:t>
+            </a:r>
+          </a:p>
+          <a:p>
+            <a:r>
+              <a:rPr lang="en-US" dirty="0"/>
               <a:t>Shoot me a slack message or meet with me for five minutes!</a:t>
             </a:r>
           </a:p>
           <a:p>
-            <a:endParaRPr lang="en-US"/>
-          </a:p>
-          <a:p>
-            <a:r>
-              <a:rPr lang="en-US"/>
+            <a:endParaRPr lang="en-US" dirty="0"/>
+          </a:p>
+          <a:p>
+            <a:r>
+              <a:rPr lang="en-US" dirty="0"/>
               <a:t>Goal is to have one or two topics in mind about a dh method/concept  that might relate to interests in some way for next time.</a:t>
             </a:r>
           </a:p>
@@ -7490,7 +7741,7 @@
           <p:cNvPr id="2" name="Title 1">
             <a:extLst>
               <a:ext uri="{FF2B5EF4-FFF2-40B4-BE49-F238E27FC236}">
-                <a16:creationId xmlns:a16="http://schemas.microsoft.com/office/drawing/2014/main" xmlns="" id="{719E81A8-FF1B-C345-AA4A-46946395F229}"/>
+                <a16:creationId xmlns:a16="http://schemas.microsoft.com/office/drawing/2014/main" id="{719E81A8-FF1B-C345-AA4A-46946395F229}"/>
               </a:ext>
             </a:extLst>
           </p:cNvPr>
@@ -7518,7 +7769,7 @@
           <p:cNvPr id="3" name="Content Placeholder 2">
             <a:extLst>
               <a:ext uri="{FF2B5EF4-FFF2-40B4-BE49-F238E27FC236}">
-                <a16:creationId xmlns:a16="http://schemas.microsoft.com/office/drawing/2014/main" xmlns="" id="{93BADEA3-2F02-1346-BCCA-17D92A5B3C67}"/>
+                <a16:creationId xmlns:a16="http://schemas.microsoft.com/office/drawing/2014/main" id="{93BADEA3-2F02-1346-BCCA-17D92A5B3C67}"/>
               </a:ext>
             </a:extLst>
           </p:cNvPr>
@@ -7531,37 +7782,26 @@
         </p:nvSpPr>
         <p:spPr/>
         <p:txBody>
-          <a:bodyPr/>
-          <a:lstStyle/>
-          <a:p>
-            <a:r>
-              <a:rPr lang="en-US" dirty="0"/>
-              <a:t>Due week of October 15th</a:t>
-            </a:r>
-          </a:p>
-          <a:p>
-            <a:r>
-              <a:rPr lang="en-US" dirty="0"/>
-              <a:t>Use it as an </a:t>
-            </a:r>
-            <a:r>
-              <a:rPr lang="en-US" dirty="0"/>
-              <a:t>opportunity to teach to learn</a:t>
-            </a:r>
-            <a:r>
-              <a:rPr lang="en-US" dirty="0" smtClean="0"/>
-              <a:t>.</a:t>
-            </a:r>
-            <a:endParaRPr lang="en-US" dirty="0" smtClean="0"/>
-          </a:p>
-          <a:p>
-            <a:r>
-              <a:rPr lang="en-US" dirty="0" smtClean="0"/>
-              <a:t>Develop </a:t>
-            </a:r>
-            <a:r>
-              <a:rPr lang="en-US" dirty="0"/>
-              <a:t>a low-tech, pencil and paper (</a:t>
+          <a:bodyPr>
+            <a:normAutofit lnSpcReduction="10000"/>
+          </a:bodyPr>
+          <a:lstStyle/>
+          <a:p>
+            <a:r>
+              <a:rPr lang="en-US" dirty="0"/>
+              <a:t>Due week of October 20th</a:t>
+            </a:r>
+          </a:p>
+          <a:p>
+            <a:r>
+              <a:rPr lang="en-US" dirty="0"/>
+              <a:t>Use it as an opportunity to teach to learn.</a:t>
+            </a:r>
+          </a:p>
+          <a:p>
+            <a:r>
+              <a:rPr lang="en-US" dirty="0"/>
+              <a:t>Develop a low-tech, pencil and paper (</a:t>
             </a:r>
             <a:r>
               <a:rPr lang="en-US" dirty="0" err="1"/>
@@ -7574,18 +7814,29 @@
           </a:p>
           <a:p>
             <a:r>
-              <a:rPr lang="en-US" dirty="0" smtClean="0"/>
-              <a:t>Be </a:t>
-            </a:r>
-            <a:r>
-              <a:rPr lang="en-US" dirty="0"/>
-              <a:t>thinking of the equity atlas.</a:t>
+              <a:rPr lang="en-US" dirty="0"/>
+              <a:t>Be thinking of connections to the project.</a:t>
             </a:r>
           </a:p>
           <a:p>
             <a:r>
               <a:rPr lang="en-US" dirty="0"/>
               <a:t>Work with others to workshop your individual workshop materials.</a:t>
+            </a:r>
+          </a:p>
+          <a:p>
+            <a:r>
+              <a:rPr lang="en-US" dirty="0"/>
+              <a:t>Outcome will be a blog post</a:t>
+            </a:r>
+          </a:p>
+          <a:p>
+            <a:endParaRPr lang="en-US" dirty="0"/>
+          </a:p>
+          <a:p>
+            <a:r>
+              <a:rPr lang="en-US" dirty="0"/>
+              <a:t>Pedagogy discussions with staff and students at W&amp;L and Yale</a:t>
             </a:r>
           </a:p>
         </p:txBody>
@@ -7625,7 +7876,7 @@
           <p:cNvPr id="2" name="Title 1">
             <a:extLst>
               <a:ext uri="{FF2B5EF4-FFF2-40B4-BE49-F238E27FC236}">
-                <a16:creationId xmlns:a16="http://schemas.microsoft.com/office/drawing/2014/main" xmlns="" id="{6AA8E53E-300C-8B48-B452-4A45CEB82A5E}"/>
+                <a16:creationId xmlns:a16="http://schemas.microsoft.com/office/drawing/2014/main" id="{6AA8E53E-300C-8B48-B452-4A45CEB82A5E}"/>
               </a:ext>
             </a:extLst>
           </p:cNvPr>
@@ -7653,7 +7904,7 @@
           <p:cNvPr id="3" name="Content Placeholder 2">
             <a:extLst>
               <a:ext uri="{FF2B5EF4-FFF2-40B4-BE49-F238E27FC236}">
-                <a16:creationId xmlns:a16="http://schemas.microsoft.com/office/drawing/2014/main" xmlns="" id="{27E63EB3-264B-D74C-AA8B-51D5DEFD889A}"/>
+                <a16:creationId xmlns:a16="http://schemas.microsoft.com/office/drawing/2014/main" id="{27E63EB3-264B-D74C-AA8B-51D5DEFD889A}"/>
               </a:ext>
             </a:extLst>
           </p:cNvPr>
@@ -7723,7 +7974,7 @@
           <p:cNvPr id="2" name="Title 1">
             <a:extLst>
               <a:ext uri="{FF2B5EF4-FFF2-40B4-BE49-F238E27FC236}">
-                <a16:creationId xmlns:a16="http://schemas.microsoft.com/office/drawing/2014/main" xmlns="" id="{28B530D9-967D-054D-86B5-AB5AF941D1BA}"/>
+                <a16:creationId xmlns:a16="http://schemas.microsoft.com/office/drawing/2014/main" id="{28B530D9-967D-054D-86B5-AB5AF941D1BA}"/>
               </a:ext>
             </a:extLst>
           </p:cNvPr>
@@ -7751,7 +8002,7 @@
           <p:cNvPr id="3" name="Content Placeholder 2">
             <a:extLst>
               <a:ext uri="{FF2B5EF4-FFF2-40B4-BE49-F238E27FC236}">
-                <a16:creationId xmlns:a16="http://schemas.microsoft.com/office/drawing/2014/main" xmlns="" id="{E597B1E2-2699-B345-A3F9-45825038A454}"/>
+                <a16:creationId xmlns:a16="http://schemas.microsoft.com/office/drawing/2014/main" id="{E597B1E2-2699-B345-A3F9-45825038A454}"/>
               </a:ext>
             </a:extLst>
           </p:cNvPr>
@@ -7827,7 +8078,7 @@
           <p:cNvPr id="2" name="Title 1">
             <a:extLst>
               <a:ext uri="{FF2B5EF4-FFF2-40B4-BE49-F238E27FC236}">
-                <a16:creationId xmlns:a16="http://schemas.microsoft.com/office/drawing/2014/main" xmlns="" id="{05192C54-6A19-934F-AEC8-6122064F5321}"/>
+                <a16:creationId xmlns:a16="http://schemas.microsoft.com/office/drawing/2014/main" id="{05192C54-6A19-934F-AEC8-6122064F5321}"/>
               </a:ext>
             </a:extLst>
           </p:cNvPr>
@@ -7855,7 +8106,7 @@
           <p:cNvPr id="3" name="Content Placeholder 2">
             <a:extLst>
               <a:ext uri="{FF2B5EF4-FFF2-40B4-BE49-F238E27FC236}">
-                <a16:creationId xmlns:a16="http://schemas.microsoft.com/office/drawing/2014/main" xmlns="" id="{2D2221DF-E173-E140-B562-CDC304DEEFC1}"/>
+                <a16:creationId xmlns:a16="http://schemas.microsoft.com/office/drawing/2014/main" id="{2D2221DF-E173-E140-B562-CDC304DEEFC1}"/>
               </a:ext>
             </a:extLst>
           </p:cNvPr>
@@ -8432,7 +8683,7 @@
   <a:extraClrSchemeLst/>
   <a:extLst>
     <a:ext uri="{05A4C25C-085E-4340-85A3-A5531E510DB2}">
-      <thm15:themeFamily xmlns:thm15="http://schemas.microsoft.com/office/thememl/2012/main" xmlns="" name="Office Theme" id="{62F939B6-93AF-4DB8-9C6B-D6C7DFDC589F}" vid="{4A3C46E8-61CC-4603-A589-7422A47A8E4A}"/>
+      <thm15:themeFamily xmlns:thm15="http://schemas.microsoft.com/office/thememl/2012/main" name="Office Theme" id="{62F939B6-93AF-4DB8-9C6B-D6C7DFDC589F}" vid="{4A3C46E8-61CC-4603-A589-7422A47A8E4A}"/>
     </a:ext>
   </a:extLst>
 </a:theme>
@@ -8727,7 +8978,7 @@
   <a:extraClrSchemeLst/>
   <a:extLst>
     <a:ext uri="{05A4C25C-085E-4340-85A3-A5531E510DB2}">
-      <thm15:themeFamily xmlns:thm15="http://schemas.microsoft.com/office/thememl/2012/main" xmlns="" name="Office Theme" id="{62F939B6-93AF-4DB8-9C6B-D6C7DFDC589F}" vid="{4A3C46E8-61CC-4603-A589-7422A47A8E4A}"/>
+      <thm15:themeFamily xmlns:thm15="http://schemas.microsoft.com/office/thememl/2012/main" name="Office Theme" id="{62F939B6-93AF-4DB8-9C6B-D6C7DFDC589F}" vid="{4A3C46E8-61CC-4603-A589-7422A47A8E4A}"/>
     </a:ext>
   </a:extLst>
 </a:theme>

</xml_diff>

<commit_message>
update with readings for critical digital pedaogyg
</commit_message>
<xml_diff>
--- a/assets/workshop-on-workshops/workshop-on-workshops.pptx
+++ b/assets/workshop-on-workshops/workshop-on-workshops.pptx
@@ -5,34 +5,35 @@
     <p:sldMasterId id="2147483648" r:id="rId1"/>
   </p:sldMasterIdLst>
   <p:notesMasterIdLst>
-    <p:notesMasterId r:id="rId27"/>
+    <p:notesMasterId r:id="rId28"/>
   </p:notesMasterIdLst>
   <p:sldIdLst>
     <p:sldId id="256" r:id="rId2"/>
     <p:sldId id="297" r:id="rId3"/>
     <p:sldId id="290" r:id="rId4"/>
-    <p:sldId id="257" r:id="rId5"/>
-    <p:sldId id="259" r:id="rId6"/>
-    <p:sldId id="292" r:id="rId7"/>
-    <p:sldId id="302" r:id="rId8"/>
-    <p:sldId id="301" r:id="rId9"/>
-    <p:sldId id="277" r:id="rId10"/>
-    <p:sldId id="278" r:id="rId11"/>
-    <p:sldId id="279" r:id="rId12"/>
-    <p:sldId id="280" r:id="rId13"/>
-    <p:sldId id="282" r:id="rId14"/>
-    <p:sldId id="283" r:id="rId15"/>
-    <p:sldId id="284" r:id="rId16"/>
-    <p:sldId id="286" r:id="rId17"/>
-    <p:sldId id="285" r:id="rId18"/>
-    <p:sldId id="299" r:id="rId19"/>
-    <p:sldId id="303" r:id="rId20"/>
-    <p:sldId id="289" r:id="rId21"/>
-    <p:sldId id="293" r:id="rId22"/>
-    <p:sldId id="296" r:id="rId23"/>
-    <p:sldId id="258" r:id="rId24"/>
-    <p:sldId id="295" r:id="rId25"/>
-    <p:sldId id="300" r:id="rId26"/>
+    <p:sldId id="304" r:id="rId5"/>
+    <p:sldId id="257" r:id="rId6"/>
+    <p:sldId id="259" r:id="rId7"/>
+    <p:sldId id="292" r:id="rId8"/>
+    <p:sldId id="302" r:id="rId9"/>
+    <p:sldId id="301" r:id="rId10"/>
+    <p:sldId id="277" r:id="rId11"/>
+    <p:sldId id="278" r:id="rId12"/>
+    <p:sldId id="279" r:id="rId13"/>
+    <p:sldId id="280" r:id="rId14"/>
+    <p:sldId id="282" r:id="rId15"/>
+    <p:sldId id="283" r:id="rId16"/>
+    <p:sldId id="284" r:id="rId17"/>
+    <p:sldId id="286" r:id="rId18"/>
+    <p:sldId id="285" r:id="rId19"/>
+    <p:sldId id="299" r:id="rId20"/>
+    <p:sldId id="303" r:id="rId21"/>
+    <p:sldId id="289" r:id="rId22"/>
+    <p:sldId id="293" r:id="rId23"/>
+    <p:sldId id="296" r:id="rId24"/>
+    <p:sldId id="258" r:id="rId25"/>
+    <p:sldId id="295" r:id="rId26"/>
+    <p:sldId id="300" r:id="rId27"/>
   </p:sldIdLst>
   <p:sldSz cx="12192000" cy="6858000"/>
   <p:notesSz cx="6858000" cy="9144000"/>
@@ -231,7 +232,7 @@
           </a:lstStyle>
           <a:p>
             <a:fld id="{D1872EBC-2E3C-CF45-9A4B-623097783979}" type="datetimeFigureOut">
-              <a:t>9/15/21</a:t>
+              <a:t>10/10/22</a:t>
             </a:fld>
             <a:endParaRPr lang="en-US"/>
           </a:p>
@@ -652,7 +653,7 @@
           <a:p>
             <a:fld id="{3C549AD9-45EC-574A-BF48-6DAFD1875592}" type="slidenum">
               <a:rPr lang="en-US" smtClean="0"/>
-              <a:t>13</a:t>
+              <a:t>14</a:t>
             </a:fld>
             <a:endParaRPr lang="en-US"/>
           </a:p>
@@ -736,7 +737,7 @@
           <a:p>
             <a:fld id="{3C549AD9-45EC-574A-BF48-6DAFD1875592}" type="slidenum">
               <a:rPr lang="en-US" smtClean="0"/>
-              <a:t>14</a:t>
+              <a:t>15</a:t>
             </a:fld>
             <a:endParaRPr lang="en-US"/>
           </a:p>
@@ -828,7 +829,7 @@
           <a:p>
             <a:fld id="{3C549AD9-45EC-574A-BF48-6DAFD1875592}" type="slidenum">
               <a:rPr lang="en-US" smtClean="0"/>
-              <a:t>15</a:t>
+              <a:t>16</a:t>
             </a:fld>
             <a:endParaRPr lang="en-US"/>
           </a:p>
@@ -968,7 +969,7 @@
           <a:p>
             <a:fld id="{3C549AD9-45EC-574A-BF48-6DAFD1875592}" type="slidenum">
               <a:rPr lang="en-US" smtClean="0"/>
-              <a:t>16</a:t>
+              <a:t>17</a:t>
             </a:fld>
             <a:endParaRPr lang="en-US"/>
           </a:p>
@@ -1055,7 +1056,7 @@
           <a:p>
             <a:fld id="{3C549AD9-45EC-574A-BF48-6DAFD1875592}" type="slidenum">
               <a:rPr lang="en-US" smtClean="0"/>
-              <a:t>17</a:t>
+              <a:t>18</a:t>
             </a:fld>
             <a:endParaRPr lang="en-US"/>
           </a:p>
@@ -1139,7 +1140,7 @@
           <a:p>
             <a:fld id="{3C549AD9-45EC-574A-BF48-6DAFD1875592}" type="slidenum">
               <a:rPr lang="en-US" smtClean="0"/>
-              <a:t>18</a:t>
+              <a:t>19</a:t>
             </a:fld>
             <a:endParaRPr lang="en-US"/>
           </a:p>
@@ -1245,7 +1246,7 @@
           <a:p>
             <a:fld id="{3C549AD9-45EC-574A-BF48-6DAFD1875592}" type="slidenum">
               <a:rPr lang="en-US" smtClean="0"/>
-              <a:t>20</a:t>
+              <a:t>21</a:t>
             </a:fld>
             <a:endParaRPr lang="en-US"/>
           </a:p>
@@ -1329,7 +1330,7 @@
           <a:p>
             <a:fld id="{B12B715B-618E-024D-9745-4BA83BFF9D40}" type="slidenum">
               <a:rPr lang="en-US" smtClean="0"/>
-              <a:t>23</a:t>
+              <a:t>24</a:t>
             </a:fld>
             <a:endParaRPr lang="en-US"/>
           </a:p>
@@ -1445,7 +1446,7 @@
           <a:lstStyle/>
           <a:p>
             <a:fld id="{B12B715B-618E-024D-9745-4BA83BFF9D40}" type="slidenum">
-              <a:t>4</a:t>
+              <a:t>5</a:t>
             </a:fld>
             <a:endParaRPr lang="en-US"/>
           </a:p>
@@ -1528,7 +1529,7 @@
           <a:lstStyle/>
           <a:p>
             <a:fld id="{B12B715B-618E-024D-9745-4BA83BFF9D40}" type="slidenum">
-              <a:t>5</a:t>
+              <a:t>6</a:t>
             </a:fld>
             <a:endParaRPr lang="en-US"/>
           </a:p>
@@ -1623,7 +1624,7 @@
           <a:p>
             <a:fld id="{B12B715B-618E-024D-9745-4BA83BFF9D40}" type="slidenum">
               <a:rPr lang="en-US" smtClean="0"/>
-              <a:t>7</a:t>
+              <a:t>8</a:t>
             </a:fld>
             <a:endParaRPr lang="en-US"/>
           </a:p>
@@ -1726,7 +1727,7 @@
           <a:p>
             <a:fld id="{B12B715B-618E-024D-9745-4BA83BFF9D40}" type="slidenum">
               <a:rPr lang="en-US" smtClean="0"/>
-              <a:t>8</a:t>
+              <a:t>9</a:t>
             </a:fld>
             <a:endParaRPr lang="en-US"/>
           </a:p>
@@ -1838,7 +1839,7 @@
           <a:p>
             <a:fld id="{3C549AD9-45EC-574A-BF48-6DAFD1875592}" type="slidenum">
               <a:rPr lang="en-US" smtClean="0"/>
-              <a:t>9</a:t>
+              <a:t>10</a:t>
             </a:fld>
             <a:endParaRPr lang="en-US"/>
           </a:p>
@@ -1930,7 +1931,7 @@
           <a:p>
             <a:fld id="{3C549AD9-45EC-574A-BF48-6DAFD1875592}" type="slidenum">
               <a:rPr lang="en-US" smtClean="0"/>
-              <a:t>10</a:t>
+              <a:t>11</a:t>
             </a:fld>
             <a:endParaRPr lang="en-US"/>
           </a:p>
@@ -2022,7 +2023,7 @@
           <a:p>
             <a:fld id="{3C549AD9-45EC-574A-BF48-6DAFD1875592}" type="slidenum">
               <a:rPr lang="en-US" smtClean="0"/>
-              <a:t>11</a:t>
+              <a:t>12</a:t>
             </a:fld>
             <a:endParaRPr lang="en-US"/>
           </a:p>
@@ -2118,7 +2119,7 @@
           <a:p>
             <a:fld id="{3C549AD9-45EC-574A-BF48-6DAFD1875592}" type="slidenum">
               <a:rPr lang="en-US" smtClean="0"/>
-              <a:t>12</a:t>
+              <a:t>13</a:t>
             </a:fld>
             <a:endParaRPr lang="en-US"/>
           </a:p>
@@ -2283,7 +2284,7 @@
           <a:lstStyle/>
           <a:p>
             <a:fld id="{6B939D22-5EF9-9546-AAFA-1A29548E4F74}" type="datetimeFigureOut">
-              <a:t>9/15/21</a:t>
+              <a:t>10/10/22</a:t>
             </a:fld>
             <a:endParaRPr lang="en-US"/>
           </a:p>
@@ -2479,7 +2480,7 @@
           <a:lstStyle/>
           <a:p>
             <a:fld id="{6B939D22-5EF9-9546-AAFA-1A29548E4F74}" type="datetimeFigureOut">
-              <a:t>9/15/21</a:t>
+              <a:t>10/10/22</a:t>
             </a:fld>
             <a:endParaRPr lang="en-US"/>
           </a:p>
@@ -2685,7 +2686,7 @@
           <a:lstStyle/>
           <a:p>
             <a:fld id="{6B939D22-5EF9-9546-AAFA-1A29548E4F74}" type="datetimeFigureOut">
-              <a:t>9/15/21</a:t>
+              <a:t>10/10/22</a:t>
             </a:fld>
             <a:endParaRPr lang="en-US"/>
           </a:p>
@@ -2881,7 +2882,7 @@
           <a:lstStyle/>
           <a:p>
             <a:fld id="{6B939D22-5EF9-9546-AAFA-1A29548E4F74}" type="datetimeFigureOut">
-              <a:t>9/15/21</a:t>
+              <a:t>10/10/22</a:t>
             </a:fld>
             <a:endParaRPr lang="en-US"/>
           </a:p>
@@ -3154,7 +3155,7 @@
           <a:lstStyle/>
           <a:p>
             <a:fld id="{6B939D22-5EF9-9546-AAFA-1A29548E4F74}" type="datetimeFigureOut">
-              <a:t>9/15/21</a:t>
+              <a:t>10/10/22</a:t>
             </a:fld>
             <a:endParaRPr lang="en-US"/>
           </a:p>
@@ -3417,7 +3418,7 @@
           <a:lstStyle/>
           <a:p>
             <a:fld id="{6B939D22-5EF9-9546-AAFA-1A29548E4F74}" type="datetimeFigureOut">
-              <a:t>9/15/21</a:t>
+              <a:t>10/10/22</a:t>
             </a:fld>
             <a:endParaRPr lang="en-US"/>
           </a:p>
@@ -3827,7 +3828,7 @@
           <a:lstStyle/>
           <a:p>
             <a:fld id="{6B939D22-5EF9-9546-AAFA-1A29548E4F74}" type="datetimeFigureOut">
-              <a:t>9/15/21</a:t>
+              <a:t>10/10/22</a:t>
             </a:fld>
             <a:endParaRPr lang="en-US"/>
           </a:p>
@@ -3966,7 +3967,7 @@
           <a:lstStyle/>
           <a:p>
             <a:fld id="{6B939D22-5EF9-9546-AAFA-1A29548E4F74}" type="datetimeFigureOut">
-              <a:t>9/15/21</a:t>
+              <a:t>10/10/22</a:t>
             </a:fld>
             <a:endParaRPr lang="en-US"/>
           </a:p>
@@ -4077,7 +4078,7 @@
           <a:lstStyle/>
           <a:p>
             <a:fld id="{6B939D22-5EF9-9546-AAFA-1A29548E4F74}" type="datetimeFigureOut">
-              <a:t>9/15/21</a:t>
+              <a:t>10/10/22</a:t>
             </a:fld>
             <a:endParaRPr lang="en-US"/>
           </a:p>
@@ -4386,7 +4387,7 @@
           <a:lstStyle/>
           <a:p>
             <a:fld id="{6B939D22-5EF9-9546-AAFA-1A29548E4F74}" type="datetimeFigureOut">
-              <a:t>9/15/21</a:t>
+              <a:t>10/10/22</a:t>
             </a:fld>
             <a:endParaRPr lang="en-US"/>
           </a:p>
@@ -4672,7 +4673,7 @@
           <a:lstStyle/>
           <a:p>
             <a:fld id="{6B939D22-5EF9-9546-AAFA-1A29548E4F74}" type="datetimeFigureOut">
-              <a:t>9/15/21</a:t>
+              <a:t>10/10/22</a:t>
             </a:fld>
             <a:endParaRPr lang="en-US"/>
           </a:p>
@@ -4911,7 +4912,7 @@
           </a:lstStyle>
           <a:p>
             <a:fld id="{6B939D22-5EF9-9546-AAFA-1A29548E4F74}" type="datetimeFigureOut">
-              <a:t>9/15/21</a:t>
+              <a:t>10/10/22</a:t>
             </a:fld>
             <a:endParaRPr lang="en-US"/>
           </a:p>
@@ -5445,16 +5446,25 @@
           <a:p>
             <a:r>
               <a:rPr lang="en-US" dirty="0"/>
-              <a:t>“I am very happy.”</a:t>
-            </a:r>
-          </a:p>
-          <a:p>
-            <a:endParaRPr lang="en-US" dirty="0"/>
-          </a:p>
-          <a:p>
-            <a:r>
-              <a:rPr lang="en-US" dirty="0"/>
-              <a:t>“She is so sad.”</a:t>
+              <a:t>But how does a text convey feeling?</a:t>
+            </a:r>
+          </a:p>
+          <a:p>
+            <a:r>
+              <a:rPr lang="en-US" dirty="0"/>
+              <a:t>Is it happy? Sad? Positive or negative?</a:t>
+            </a:r>
+          </a:p>
+          <a:p>
+            <a:r>
+              <a:rPr lang="en-US" dirty="0"/>
+              <a:t>Complicated questions!</a:t>
+            </a:r>
+          </a:p>
+          <a:p>
+            <a:r>
+              <a:rPr lang="en-US" dirty="0"/>
+              <a:t>Let’s try to tell with simple examples…</a:t>
             </a:r>
           </a:p>
         </p:txBody>
@@ -5462,7 +5472,7 @@
     </p:spTree>
     <p:extLst>
       <p:ext uri="{BB962C8B-B14F-4D97-AF65-F5344CB8AC3E}">
-        <p14:creationId xmlns:p14="http://schemas.microsoft.com/office/powerpoint/2010/main" val="1730919776"/>
+        <p14:creationId xmlns:p14="http://schemas.microsoft.com/office/powerpoint/2010/main" val="129063420"/>
       </p:ext>
     </p:extLst>
   </p:cSld>
@@ -5528,18 +5538,24 @@
           <a:p>
             <a:r>
               <a:rPr lang="en-US" dirty="0"/>
-              <a:t>"It was the best of times, it was the worst of times…”</a:t>
+              <a:t>“I am very happy.”</a:t>
             </a:r>
           </a:p>
           <a:p>
             <a:endParaRPr lang="en-US" dirty="0"/>
+          </a:p>
+          <a:p>
+            <a:r>
+              <a:rPr lang="en-US" dirty="0"/>
+              <a:t>“She is so sad.”</a:t>
+            </a:r>
           </a:p>
         </p:txBody>
       </p:sp>
     </p:spTree>
     <p:extLst>
       <p:ext uri="{BB962C8B-B14F-4D97-AF65-F5344CB8AC3E}">
-        <p14:creationId xmlns:p14="http://schemas.microsoft.com/office/powerpoint/2010/main" val="3026010112"/>
+        <p14:creationId xmlns:p14="http://schemas.microsoft.com/office/powerpoint/2010/main" val="1730919776"/>
       </p:ext>
     </p:extLst>
   </p:cSld>
@@ -5611,24 +5627,12 @@
           <a:p>
             <a:endParaRPr lang="en-US" dirty="0"/>
           </a:p>
-          <a:p>
-            <a:r>
-              <a:rPr lang="en-US" dirty="0"/>
-              <a:t>Not a clear answer overall. If we can’t tell, how would a computer?</a:t>
-            </a:r>
-          </a:p>
-          <a:p>
-            <a:r>
-              <a:rPr lang="en-US" dirty="0"/>
-              <a:t>We need a better way to register this. Let’s go word by word.</a:t>
-            </a:r>
-          </a:p>
         </p:txBody>
       </p:sp>
     </p:spTree>
     <p:extLst>
       <p:ext uri="{BB962C8B-B14F-4D97-AF65-F5344CB8AC3E}">
-        <p14:creationId xmlns:p14="http://schemas.microsoft.com/office/powerpoint/2010/main" val="1232154753"/>
+        <p14:creationId xmlns:p14="http://schemas.microsoft.com/office/powerpoint/2010/main" val="3026010112"/>
       </p:ext>
     </p:extLst>
   </p:cSld>
@@ -5679,94 +5683,37 @@
       </p:sp>
       <p:sp>
         <p:nvSpPr>
-          <p:cNvPr id="4" name="Rectangle 3"/>
-          <p:cNvSpPr/>
-          <p:nvPr/>
-        </p:nvSpPr>
-        <p:spPr>
-          <a:xfrm>
-            <a:off x="1981201" y="1720840"/>
-            <a:ext cx="8229600" cy="4708981"/>
-          </a:xfrm>
-          <a:prstGeom prst="rect">
-            <a:avLst/>
-          </a:prstGeom>
-        </p:spPr>
-        <p:txBody>
-          <a:bodyPr wrap="square">
-            <a:spAutoFit/>
-          </a:bodyPr>
-          <a:lstStyle/>
-          <a:p>
-            <a:r>
-              <a:rPr lang="en-US" sz="2500" dirty="0"/>
-              <a:t>"It </a:t>
-            </a:r>
-          </a:p>
-          <a:p>
-            <a:r>
-              <a:rPr lang="en-US" sz="2500" dirty="0"/>
-              <a:t>was </a:t>
-            </a:r>
-          </a:p>
-          <a:p>
-            <a:r>
-              <a:rPr lang="en-US" sz="2500" dirty="0"/>
-              <a:t>the </a:t>
-            </a:r>
-          </a:p>
-          <a:p>
-            <a:r>
-              <a:rPr lang="en-US" sz="2500" dirty="0"/>
-              <a:t>best			happy! / positive</a:t>
-            </a:r>
-          </a:p>
-          <a:p>
-            <a:r>
-              <a:rPr lang="en-US" sz="2500" dirty="0"/>
-              <a:t>of </a:t>
-            </a:r>
-          </a:p>
-          <a:p>
-            <a:r>
-              <a:rPr lang="en-US" sz="2500" dirty="0"/>
-              <a:t>times, </a:t>
-            </a:r>
-          </a:p>
-          <a:p>
-            <a:r>
-              <a:rPr lang="en-US" sz="2500" dirty="0"/>
-              <a:t>it </a:t>
-            </a:r>
-          </a:p>
-          <a:p>
-            <a:r>
-              <a:rPr lang="en-US" sz="2500" dirty="0"/>
-              <a:t>was </a:t>
-            </a:r>
-          </a:p>
-          <a:p>
-            <a:r>
-              <a:rPr lang="en-US" sz="2500" dirty="0"/>
-              <a:t>the </a:t>
-            </a:r>
-          </a:p>
-          <a:p>
-            <a:r>
-              <a:rPr lang="en-US" sz="2500" dirty="0"/>
-              <a:t>worst			sad! / negative</a:t>
-            </a:r>
-          </a:p>
-          <a:p>
-            <a:r>
-              <a:rPr lang="en-US" sz="2500" dirty="0"/>
-              <a:t>of </a:t>
-            </a:r>
-          </a:p>
-          <a:p>
-            <a:r>
-              <a:rPr lang="en-US" sz="2500" dirty="0"/>
-              <a:t>times…"</a:t>
+          <p:cNvPr id="3" name="Content Placeholder 2"/>
+          <p:cNvSpPr>
+            <a:spLocks noGrp="1"/>
+          </p:cNvSpPr>
+          <p:nvPr>
+            <p:ph idx="1"/>
+          </p:nvPr>
+        </p:nvSpPr>
+        <p:spPr/>
+        <p:txBody>
+          <a:bodyPr/>
+          <a:lstStyle/>
+          <a:p>
+            <a:r>
+              <a:rPr lang="en-US" dirty="0"/>
+              <a:t>"It was the best of times, it was the worst of times…”</a:t>
+            </a:r>
+          </a:p>
+          <a:p>
+            <a:endParaRPr lang="en-US" dirty="0"/>
+          </a:p>
+          <a:p>
+            <a:r>
+              <a:rPr lang="en-US" dirty="0"/>
+              <a:t>Not a clear answer overall. If we can’t tell, how would a computer?</a:t>
+            </a:r>
+          </a:p>
+          <a:p>
+            <a:r>
+              <a:rPr lang="en-US" dirty="0"/>
+              <a:t>We need a better way to register this. Let’s go word by word.</a:t>
             </a:r>
           </a:p>
         </p:txBody>
@@ -5774,7 +5721,7 @@
     </p:spTree>
     <p:extLst>
       <p:ext uri="{BB962C8B-B14F-4D97-AF65-F5344CB8AC3E}">
-        <p14:creationId xmlns:p14="http://schemas.microsoft.com/office/powerpoint/2010/main" val="3720841124"/>
+        <p14:creationId xmlns:p14="http://schemas.microsoft.com/office/powerpoint/2010/main" val="1232154753"/>
       </p:ext>
     </p:extLst>
   </p:cSld>
@@ -5864,7 +5811,7 @@
           <a:p>
             <a:r>
               <a:rPr lang="en-US" sz="2500" dirty="0"/>
-              <a:t>best			happy! / positive / 1</a:t>
+              <a:t>best			happy! / positive</a:t>
             </a:r>
           </a:p>
           <a:p>
@@ -5900,7 +5847,7 @@
           <a:p>
             <a:r>
               <a:rPr lang="en-US" sz="2500" dirty="0"/>
-              <a:t>worst			sad! / negative / -1</a:t>
+              <a:t>worst			sad! / negative</a:t>
             </a:r>
           </a:p>
           <a:p>
@@ -5920,7 +5867,7 @@
     </p:spTree>
     <p:extLst>
       <p:ext uri="{BB962C8B-B14F-4D97-AF65-F5344CB8AC3E}">
-        <p14:creationId xmlns:p14="http://schemas.microsoft.com/office/powerpoint/2010/main" val="3016996679"/>
+        <p14:creationId xmlns:p14="http://schemas.microsoft.com/office/powerpoint/2010/main" val="3720841124"/>
       </p:ext>
     </p:extLst>
   </p:cSld>
@@ -5971,81 +5918,94 @@
       </p:sp>
       <p:sp>
         <p:nvSpPr>
-          <p:cNvPr id="3" name="Content Placeholder 2"/>
-          <p:cNvSpPr>
-            <a:spLocks noGrp="1"/>
-          </p:cNvSpPr>
-          <p:nvPr>
-            <p:ph idx="1"/>
-          </p:nvPr>
-        </p:nvSpPr>
-        <p:spPr/>
-        <p:txBody>
-          <a:bodyPr>
-            <a:normAutofit/>
+          <p:cNvPr id="4" name="Rectangle 3"/>
+          <p:cNvSpPr/>
+          <p:nvPr/>
+        </p:nvSpPr>
+        <p:spPr>
+          <a:xfrm>
+            <a:off x="1981201" y="1720840"/>
+            <a:ext cx="8229600" cy="4708981"/>
+          </a:xfrm>
+          <a:prstGeom prst="rect">
+            <a:avLst/>
+          </a:prstGeom>
+        </p:spPr>
+        <p:txBody>
+          <a:bodyPr wrap="square">
+            <a:spAutoFit/>
           </a:bodyPr>
           <a:lstStyle/>
           <a:p>
             <a:r>
-              <a:rPr lang="en-US" dirty="0"/>
-              <a:t>"It was the best of times, it was the worst of times…”</a:t>
-            </a:r>
-          </a:p>
-          <a:p>
-            <a:pPr marL="0" indent="0">
-              <a:buNone/>
-            </a:pPr>
-            <a:r>
-              <a:rPr lang="en-US" dirty="0"/>
-              <a:t>		1			-1 					</a:t>
-            </a:r>
-          </a:p>
-          <a:p>
-            <a:pPr marL="0" indent="0">
-              <a:buNone/>
-            </a:pPr>
-            <a:endParaRPr lang="en-US" dirty="0"/>
-          </a:p>
-          <a:p>
-            <a:pPr marL="0" indent="0">
-              <a:buNone/>
-            </a:pPr>
-            <a:r>
-              <a:rPr lang="en-US" dirty="0"/>
-              <a:t>Total = 0</a:t>
-            </a:r>
-          </a:p>
-          <a:p>
-            <a:pPr marL="0" indent="0">
-              <a:buNone/>
-            </a:pPr>
-            <a:r>
-              <a:rPr lang="en-US" dirty="0"/>
-              <a:t>Overall neutral sentiment?</a:t>
-            </a:r>
-          </a:p>
-          <a:p>
-            <a:pPr marL="0" indent="0">
-              <a:buNone/>
-            </a:pPr>
-            <a:endParaRPr lang="en-US" dirty="0"/>
-          </a:p>
-          <a:p>
-            <a:pPr marL="0" indent="0">
-              <a:buNone/>
-            </a:pPr>
-            <a:r>
-              <a:rPr lang="en-US" dirty="0"/>
-              <a:t>So we can get at the emotional score of a sentence, by</a:t>
-            </a:r>
-          </a:p>
-          <a:p>
-            <a:pPr marL="0" indent="0">
-              <a:buNone/>
-            </a:pPr>
-            <a:r>
-              <a:rPr lang="en-US" dirty="0"/>
-              <a:t>a) assigning values to +/- words and b) counting up those values</a:t>
+              <a:rPr lang="en-US" sz="2500" dirty="0"/>
+              <a:t>"It </a:t>
+            </a:r>
+          </a:p>
+          <a:p>
+            <a:r>
+              <a:rPr lang="en-US" sz="2500" dirty="0"/>
+              <a:t>was </a:t>
+            </a:r>
+          </a:p>
+          <a:p>
+            <a:r>
+              <a:rPr lang="en-US" sz="2500" dirty="0"/>
+              <a:t>the </a:t>
+            </a:r>
+          </a:p>
+          <a:p>
+            <a:r>
+              <a:rPr lang="en-US" sz="2500" dirty="0"/>
+              <a:t>best			happy! / positive / 1</a:t>
+            </a:r>
+          </a:p>
+          <a:p>
+            <a:r>
+              <a:rPr lang="en-US" sz="2500" dirty="0"/>
+              <a:t>of </a:t>
+            </a:r>
+          </a:p>
+          <a:p>
+            <a:r>
+              <a:rPr lang="en-US" sz="2500" dirty="0"/>
+              <a:t>times, </a:t>
+            </a:r>
+          </a:p>
+          <a:p>
+            <a:r>
+              <a:rPr lang="en-US" sz="2500" dirty="0"/>
+              <a:t>it </a:t>
+            </a:r>
+          </a:p>
+          <a:p>
+            <a:r>
+              <a:rPr lang="en-US" sz="2500" dirty="0"/>
+              <a:t>was </a:t>
+            </a:r>
+          </a:p>
+          <a:p>
+            <a:r>
+              <a:rPr lang="en-US" sz="2500" dirty="0"/>
+              <a:t>the </a:t>
+            </a:r>
+          </a:p>
+          <a:p>
+            <a:r>
+              <a:rPr lang="en-US" sz="2500" dirty="0"/>
+              <a:t>worst			sad! / negative / -1</a:t>
+            </a:r>
+          </a:p>
+          <a:p>
+            <a:r>
+              <a:rPr lang="en-US" sz="2500" dirty="0"/>
+              <a:t>of </a:t>
+            </a:r>
+          </a:p>
+          <a:p>
+            <a:r>
+              <a:rPr lang="en-US" sz="2500" dirty="0"/>
+              <a:t>times…"</a:t>
             </a:r>
           </a:p>
         </p:txBody>
@@ -6053,7 +6013,7 @@
     </p:spTree>
     <p:extLst>
       <p:ext uri="{BB962C8B-B14F-4D97-AF65-F5344CB8AC3E}">
-        <p14:creationId xmlns:p14="http://schemas.microsoft.com/office/powerpoint/2010/main" val="3703551723"/>
+        <p14:creationId xmlns:p14="http://schemas.microsoft.com/office/powerpoint/2010/main" val="3016996679"/>
       </p:ext>
     </p:extLst>
   </p:cSld>
@@ -6114,39 +6074,71 @@
         </p:nvSpPr>
         <p:spPr/>
         <p:txBody>
-          <a:bodyPr/>
-          <a:lstStyle/>
-          <a:p>
-            <a:r>
-              <a:rPr lang="en-US" dirty="0"/>
-              <a:t>Glance at the three excerpts on your handout and think about them in this way. </a:t>
-            </a:r>
-          </a:p>
-          <a:p>
-            <a:r>
-              <a:rPr lang="en-US" dirty="0"/>
-              <a:t>Which do you expect to be happiest? Saddest?</a:t>
-            </a:r>
-          </a:p>
-          <a:p>
-            <a:r>
-              <a:rPr lang="en-US" dirty="0"/>
-              <a:t>Do this mathematical charting for at least one of the paragraphs.</a:t>
-            </a:r>
-          </a:p>
-          <a:p>
-            <a:r>
-              <a:rPr lang="en-US" dirty="0"/>
-              <a:t>Any problems or questions that this raises?</a:t>
-            </a:r>
-          </a:p>
-          <a:p>
+          <a:bodyPr>
+            <a:normAutofit/>
+          </a:bodyPr>
+          <a:lstStyle/>
+          <a:p>
+            <a:r>
+              <a:rPr lang="en-US" dirty="0"/>
+              <a:t>"It was the best of times, it was the worst of times…”</a:t>
+            </a:r>
+          </a:p>
+          <a:p>
+            <a:pPr marL="0" indent="0">
+              <a:buNone/>
+            </a:pPr>
+            <a:r>
+              <a:rPr lang="en-US" dirty="0"/>
+              <a:t>		1			-1 					</a:t>
+            </a:r>
+          </a:p>
+          <a:p>
+            <a:pPr marL="0" indent="0">
+              <a:buNone/>
+            </a:pPr>
             <a:endParaRPr lang="en-US" dirty="0"/>
           </a:p>
           <a:p>
-            <a:r>
-              <a:rPr lang="en-US" dirty="0"/>
-              <a:t>In breakout rooms or pairs</a:t>
+            <a:pPr marL="0" indent="0">
+              <a:buNone/>
+            </a:pPr>
+            <a:r>
+              <a:rPr lang="en-US" dirty="0"/>
+              <a:t>Total = 0</a:t>
+            </a:r>
+          </a:p>
+          <a:p>
+            <a:pPr marL="0" indent="0">
+              <a:buNone/>
+            </a:pPr>
+            <a:r>
+              <a:rPr lang="en-US" dirty="0"/>
+              <a:t>Overall neutral sentiment?</a:t>
+            </a:r>
+          </a:p>
+          <a:p>
+            <a:pPr marL="0" indent="0">
+              <a:buNone/>
+            </a:pPr>
+            <a:endParaRPr lang="en-US" dirty="0"/>
+          </a:p>
+          <a:p>
+            <a:pPr marL="0" indent="0">
+              <a:buNone/>
+            </a:pPr>
+            <a:r>
+              <a:rPr lang="en-US" dirty="0"/>
+              <a:t>So we can get at the emotional score of a sentence, by</a:t>
+            </a:r>
+          </a:p>
+          <a:p>
+            <a:pPr marL="0" indent="0">
+              <a:buNone/>
+            </a:pPr>
+            <a:r>
+              <a:rPr lang="en-US" dirty="0"/>
+              <a:t>a) assigning values to +/- words and b) counting up those values</a:t>
             </a:r>
           </a:p>
         </p:txBody>
@@ -6154,7 +6146,7 @@
     </p:spTree>
     <p:extLst>
       <p:ext uri="{BB962C8B-B14F-4D97-AF65-F5344CB8AC3E}">
-        <p14:creationId xmlns:p14="http://schemas.microsoft.com/office/powerpoint/2010/main" val="1954955825"/>
+        <p14:creationId xmlns:p14="http://schemas.microsoft.com/office/powerpoint/2010/main" val="3703551723"/>
       </p:ext>
     </p:extLst>
   </p:cSld>
@@ -6215,52 +6207,47 @@
         </p:nvSpPr>
         <p:spPr/>
         <p:txBody>
-          <a:bodyPr>
-            <a:normAutofit/>
-          </a:bodyPr>
-          <a:lstStyle/>
-          <a:p>
-            <a:r>
-              <a:rPr lang="en-US" dirty="0"/>
-              <a:t>Can imagine a range of emotions: good, better, best.</a:t>
-            </a:r>
-          </a:p>
-          <a:p>
-            <a:r>
-              <a:rPr lang="en-US" dirty="0"/>
-              <a:t>So you could use a range of numbers: good = +1, better= +3, best = +5</a:t>
-            </a:r>
-          </a:p>
-          <a:p>
-            <a:r>
-              <a:rPr lang="en-US" dirty="0"/>
-              <a:t>Say, assign any emotion-laden word a number between -5 and +5. </a:t>
-            </a:r>
-          </a:p>
-          <a:p>
-            <a:r>
-              <a:rPr lang="en-US" dirty="0"/>
-              <a:t>Keep in mind that you’re not reading for context. Simply on a word-by-word basis.</a:t>
-            </a:r>
-          </a:p>
-          <a:p>
-            <a:r>
-              <a:rPr lang="en-US" dirty="0"/>
-              <a:t>So “yes” would be positive. “no” would be negative</a:t>
+          <a:bodyPr/>
+          <a:lstStyle/>
+          <a:p>
+            <a:r>
+              <a:rPr lang="en-US" dirty="0"/>
+              <a:t>Glance at the excerpts on your handout and think about them in this way. </a:t>
+            </a:r>
+          </a:p>
+          <a:p>
+            <a:r>
+              <a:rPr lang="en-US" dirty="0"/>
+              <a:t>Which do you expect to be happiest? Saddest?</a:t>
+            </a:r>
+          </a:p>
+          <a:p>
+            <a:r>
+              <a:rPr lang="en-US" dirty="0"/>
+              <a:t>Do this mathematical charting for at least one of the paragraphs.</a:t>
+            </a:r>
+          </a:p>
+          <a:p>
+            <a:r>
+              <a:rPr lang="en-US" dirty="0"/>
+              <a:t>What problems or questions does this raise?</a:t>
             </a:r>
           </a:p>
           <a:p>
             <a:endParaRPr lang="en-US" dirty="0"/>
           </a:p>
           <a:p>
-            <a:endParaRPr lang="en-US" dirty="0"/>
+            <a:r>
+              <a:rPr lang="en-US" dirty="0"/>
+              <a:t>Do in pairs</a:t>
+            </a:r>
           </a:p>
         </p:txBody>
       </p:sp>
     </p:spTree>
     <p:extLst>
       <p:ext uri="{BB962C8B-B14F-4D97-AF65-F5344CB8AC3E}">
-        <p14:creationId xmlns:p14="http://schemas.microsoft.com/office/powerpoint/2010/main" val="3202000274"/>
+        <p14:creationId xmlns:p14="http://schemas.microsoft.com/office/powerpoint/2010/main" val="1954955825"/>
       </p:ext>
     </p:extLst>
   </p:cSld>
@@ -6328,6 +6315,112 @@
           <a:p>
             <a:r>
               <a:rPr lang="en-US" dirty="0"/>
+              <a:t>Can imagine a range of emotions: good, better, best.</a:t>
+            </a:r>
+          </a:p>
+          <a:p>
+            <a:r>
+              <a:rPr lang="en-US" dirty="0"/>
+              <a:t>So you could use a range of numbers: good = +1, better= +3, best = +5</a:t>
+            </a:r>
+          </a:p>
+          <a:p>
+            <a:r>
+              <a:rPr lang="en-US" dirty="0"/>
+              <a:t>Say, assign any emotion-laden word a number between -5 and +5. </a:t>
+            </a:r>
+          </a:p>
+          <a:p>
+            <a:r>
+              <a:rPr lang="en-US" dirty="0"/>
+              <a:t>Keep in mind that you’re not reading for context. Simply on a word-by-word basis.</a:t>
+            </a:r>
+          </a:p>
+          <a:p>
+            <a:r>
+              <a:rPr lang="en-US" dirty="0"/>
+              <a:t>So “yes” would be positive. “no” would be negative</a:t>
+            </a:r>
+          </a:p>
+          <a:p>
+            <a:endParaRPr lang="en-US" dirty="0"/>
+          </a:p>
+          <a:p>
+            <a:endParaRPr lang="en-US" dirty="0"/>
+          </a:p>
+        </p:txBody>
+      </p:sp>
+    </p:spTree>
+    <p:extLst>
+      <p:ext uri="{BB962C8B-B14F-4D97-AF65-F5344CB8AC3E}">
+        <p14:creationId xmlns:p14="http://schemas.microsoft.com/office/powerpoint/2010/main" val="3202000274"/>
+      </p:ext>
+    </p:extLst>
+  </p:cSld>
+  <p:clrMapOvr>
+    <a:masterClrMapping/>
+  </p:clrMapOvr>
+</p:sld>
+</file>
+
+<file path=ppt/slides/slide19.xml><?xml version="1.0" encoding="utf-8"?>
+<p:sld xmlns:a="http://schemas.openxmlformats.org/drawingml/2006/main" xmlns:r="http://schemas.openxmlformats.org/officeDocument/2006/relationships" xmlns:p="http://schemas.openxmlformats.org/presentationml/2006/main">
+  <p:cSld>
+    <p:spTree>
+      <p:nvGrpSpPr>
+        <p:cNvPr id="1" name=""/>
+        <p:cNvGrpSpPr/>
+        <p:nvPr/>
+      </p:nvGrpSpPr>
+      <p:grpSpPr>
+        <a:xfrm>
+          <a:off x="0" y="0"/>
+          <a:ext cx="0" cy="0"/>
+          <a:chOff x="0" y="0"/>
+          <a:chExt cx="0" cy="0"/>
+        </a:xfrm>
+      </p:grpSpPr>
+      <p:sp>
+        <p:nvSpPr>
+          <p:cNvPr id="2" name="Title 1"/>
+          <p:cNvSpPr>
+            <a:spLocks noGrp="1"/>
+          </p:cNvSpPr>
+          <p:nvPr>
+            <p:ph type="title"/>
+          </p:nvPr>
+        </p:nvSpPr>
+        <p:spPr/>
+        <p:txBody>
+          <a:bodyPr/>
+          <a:lstStyle/>
+          <a:p>
+            <a:r>
+              <a:rPr lang="en-US" dirty="0"/>
+              <a:t>Sentiment Analysis</a:t>
+            </a:r>
+          </a:p>
+        </p:txBody>
+      </p:sp>
+      <p:sp>
+        <p:nvSpPr>
+          <p:cNvPr id="3" name="Content Placeholder 2"/>
+          <p:cNvSpPr>
+            <a:spLocks noGrp="1"/>
+          </p:cNvSpPr>
+          <p:nvPr>
+            <p:ph idx="1"/>
+          </p:nvPr>
+        </p:nvSpPr>
+        <p:spPr/>
+        <p:txBody>
+          <a:bodyPr>
+            <a:normAutofit/>
+          </a:bodyPr>
+          <a:lstStyle/>
+          <a:p>
+            <a:r>
+              <a:rPr lang="en-US" dirty="0"/>
               <a:t>How do we account for context?</a:t>
             </a:r>
           </a:p>
@@ -6370,7 +6463,127 @@
 </p:sld>
 </file>
 
-<file path=ppt/slides/slide19.xml><?xml version="1.0" encoding="utf-8"?>
+<file path=ppt/slides/slide2.xml><?xml version="1.0" encoding="utf-8"?>
+<p:sld xmlns:a="http://schemas.openxmlformats.org/drawingml/2006/main" xmlns:r="http://schemas.openxmlformats.org/officeDocument/2006/relationships" xmlns:p="http://schemas.openxmlformats.org/presentationml/2006/main">
+  <p:cSld>
+    <p:spTree>
+      <p:nvGrpSpPr>
+        <p:cNvPr id="1" name=""/>
+        <p:cNvGrpSpPr/>
+        <p:nvPr/>
+      </p:nvGrpSpPr>
+      <p:grpSpPr>
+        <a:xfrm>
+          <a:off x="0" y="0"/>
+          <a:ext cx="0" cy="0"/>
+          <a:chOff x="0" y="0"/>
+          <a:chExt cx="0" cy="0"/>
+        </a:xfrm>
+      </p:grpSpPr>
+      <p:sp>
+        <p:nvSpPr>
+          <p:cNvPr id="2" name="Title 1">
+            <a:extLst>
+              <a:ext uri="{FF2B5EF4-FFF2-40B4-BE49-F238E27FC236}">
+                <a16:creationId xmlns:a16="http://schemas.microsoft.com/office/drawing/2014/main" id="{746AE940-B64B-3C44-A159-BF5C5462B4B0}"/>
+              </a:ext>
+            </a:extLst>
+          </p:cNvPr>
+          <p:cNvSpPr>
+            <a:spLocks noGrp="1"/>
+          </p:cNvSpPr>
+          <p:nvPr>
+            <p:ph type="title"/>
+          </p:nvPr>
+        </p:nvSpPr>
+        <p:spPr/>
+        <p:txBody>
+          <a:bodyPr/>
+          <a:lstStyle/>
+          <a:p>
+            <a:r>
+              <a:rPr lang="en-US"/>
+              <a:t>Plan</a:t>
+            </a:r>
+          </a:p>
+        </p:txBody>
+      </p:sp>
+      <p:sp>
+        <p:nvSpPr>
+          <p:cNvPr id="3" name="Content Placeholder 2">
+            <a:extLst>
+              <a:ext uri="{FF2B5EF4-FFF2-40B4-BE49-F238E27FC236}">
+                <a16:creationId xmlns:a16="http://schemas.microsoft.com/office/drawing/2014/main" id="{73AB9B70-C367-2044-BBEB-33A895F06D69}"/>
+              </a:ext>
+            </a:extLst>
+          </p:cNvPr>
+          <p:cNvSpPr>
+            <a:spLocks noGrp="1"/>
+          </p:cNvSpPr>
+          <p:nvPr>
+            <p:ph idx="1"/>
+          </p:nvPr>
+        </p:nvSpPr>
+        <p:spPr/>
+        <p:txBody>
+          <a:bodyPr/>
+          <a:lstStyle/>
+          <a:p>
+            <a:pPr marL="514350" indent="-514350">
+              <a:buFont typeface="+mj-lt"/>
+              <a:buAutoNum type="arabicPeriod"/>
+            </a:pPr>
+            <a:r>
+              <a:rPr lang="en-US" dirty="0"/>
+              <a:t>Frame next assignment</a:t>
+            </a:r>
+          </a:p>
+          <a:p>
+            <a:pPr marL="514350" indent="-514350">
+              <a:buFont typeface="+mj-lt"/>
+              <a:buAutoNum type="arabicPeriod"/>
+            </a:pPr>
+            <a:r>
+              <a:rPr lang="en-US" dirty="0"/>
+              <a:t>Discuss concept behind it</a:t>
+            </a:r>
+          </a:p>
+          <a:p>
+            <a:pPr marL="514350" indent="-514350">
+              <a:buFont typeface="+mj-lt"/>
+              <a:buAutoNum type="arabicPeriod"/>
+            </a:pPr>
+            <a:r>
+              <a:rPr lang="en-US" dirty="0"/>
+              <a:t>Share and work through Brandon's example lesson</a:t>
+            </a:r>
+          </a:p>
+          <a:p>
+            <a:pPr marL="514350" indent="-514350">
+              <a:buFont typeface="+mj-lt"/>
+              <a:buAutoNum type="arabicPeriod"/>
+            </a:pPr>
+            <a:r>
+              <a:rPr lang="en-US" dirty="0"/>
+              <a:t>Discuss Critical Digital Pedagogy</a:t>
+            </a:r>
+          </a:p>
+        </p:txBody>
+      </p:sp>
+    </p:spTree>
+    <p:extLst>
+      <p:ext uri="{BB962C8B-B14F-4D97-AF65-F5344CB8AC3E}">
+        <p14:creationId xmlns:p14="http://schemas.microsoft.com/office/powerpoint/2010/main" val="3772974234"/>
+      </p:ext>
+    </p:extLst>
+  </p:cSld>
+  <p:clrMapOvr>
+    <a:masterClrMapping/>
+  </p:clrMapOvr>
+</p:sld>
+</file>
+
+<file path=ppt/slides/slide20.xml><?xml version="1.0" encoding="utf-8"?>
 <p:sld xmlns:a="http://schemas.openxmlformats.org/drawingml/2006/main" xmlns:r="http://schemas.openxmlformats.org/officeDocument/2006/relationships" xmlns:p="http://schemas.openxmlformats.org/presentationml/2006/main">
   <p:cSld>
     <p:bg>
@@ -6594,117 +6807,7 @@
 </p:sld>
 </file>
 
-<file path=ppt/slides/slide2.xml><?xml version="1.0" encoding="utf-8"?>
-<p:sld xmlns:a="http://schemas.openxmlformats.org/drawingml/2006/main" xmlns:r="http://schemas.openxmlformats.org/officeDocument/2006/relationships" xmlns:p="http://schemas.openxmlformats.org/presentationml/2006/main">
-  <p:cSld>
-    <p:spTree>
-      <p:nvGrpSpPr>
-        <p:cNvPr id="1" name=""/>
-        <p:cNvGrpSpPr/>
-        <p:nvPr/>
-      </p:nvGrpSpPr>
-      <p:grpSpPr>
-        <a:xfrm>
-          <a:off x="0" y="0"/>
-          <a:ext cx="0" cy="0"/>
-          <a:chOff x="0" y="0"/>
-          <a:chExt cx="0" cy="0"/>
-        </a:xfrm>
-      </p:grpSpPr>
-      <p:sp>
-        <p:nvSpPr>
-          <p:cNvPr id="2" name="Title 1">
-            <a:extLst>
-              <a:ext uri="{FF2B5EF4-FFF2-40B4-BE49-F238E27FC236}">
-                <a16:creationId xmlns:a16="http://schemas.microsoft.com/office/drawing/2014/main" id="{746AE940-B64B-3C44-A159-BF5C5462B4B0}"/>
-              </a:ext>
-            </a:extLst>
-          </p:cNvPr>
-          <p:cNvSpPr>
-            <a:spLocks noGrp="1"/>
-          </p:cNvSpPr>
-          <p:nvPr>
-            <p:ph type="title"/>
-          </p:nvPr>
-        </p:nvSpPr>
-        <p:spPr/>
-        <p:txBody>
-          <a:bodyPr/>
-          <a:lstStyle/>
-          <a:p>
-            <a:r>
-              <a:rPr lang="en-US"/>
-              <a:t>Plan</a:t>
-            </a:r>
-          </a:p>
-        </p:txBody>
-      </p:sp>
-      <p:sp>
-        <p:nvSpPr>
-          <p:cNvPr id="3" name="Content Placeholder 2">
-            <a:extLst>
-              <a:ext uri="{FF2B5EF4-FFF2-40B4-BE49-F238E27FC236}">
-                <a16:creationId xmlns:a16="http://schemas.microsoft.com/office/drawing/2014/main" id="{73AB9B70-C367-2044-BBEB-33A895F06D69}"/>
-              </a:ext>
-            </a:extLst>
-          </p:cNvPr>
-          <p:cNvSpPr>
-            <a:spLocks noGrp="1"/>
-          </p:cNvSpPr>
-          <p:nvPr>
-            <p:ph idx="1"/>
-          </p:nvPr>
-        </p:nvSpPr>
-        <p:spPr/>
-        <p:txBody>
-          <a:bodyPr/>
-          <a:lstStyle/>
-          <a:p>
-            <a:pPr marL="514350" indent="-514350">
-              <a:buFont typeface="+mj-lt"/>
-              <a:buAutoNum type="arabicPeriod"/>
-            </a:pPr>
-            <a:r>
-              <a:rPr lang="en-US" dirty="0"/>
-              <a:t>Frame next assignment</a:t>
-            </a:r>
-          </a:p>
-          <a:p>
-            <a:pPr marL="514350" indent="-514350">
-              <a:buFont typeface="+mj-lt"/>
-              <a:buAutoNum type="arabicPeriod"/>
-            </a:pPr>
-            <a:r>
-              <a:rPr lang="en-US" dirty="0"/>
-              <a:t>Discuss concept behind it</a:t>
-            </a:r>
-          </a:p>
-          <a:p>
-            <a:pPr marL="514350" indent="-514350">
-              <a:buFont typeface="+mj-lt"/>
-              <a:buAutoNum type="arabicPeriod"/>
-            </a:pPr>
-            <a:r>
-              <a:rPr lang="en-US" dirty="0"/>
-              <a:t>Share and work through Brandon's example lesson</a:t>
-            </a:r>
-          </a:p>
-        </p:txBody>
-      </p:sp>
-    </p:spTree>
-    <p:extLst>
-      <p:ext uri="{BB962C8B-B14F-4D97-AF65-F5344CB8AC3E}">
-        <p14:creationId xmlns:p14="http://schemas.microsoft.com/office/powerpoint/2010/main" val="3772974234"/>
-      </p:ext>
-    </p:extLst>
-  </p:cSld>
-  <p:clrMapOvr>
-    <a:masterClrMapping/>
-  </p:clrMapOvr>
-</p:sld>
-</file>
-
-<file path=ppt/slides/slide20.xml><?xml version="1.0" encoding="utf-8"?>
+<file path=ppt/slides/slide21.xml><?xml version="1.0" encoding="utf-8"?>
 <p:sld xmlns:a="http://schemas.openxmlformats.org/drawingml/2006/main" xmlns:r="http://schemas.openxmlformats.org/officeDocument/2006/relationships" xmlns:p="http://schemas.openxmlformats.org/presentationml/2006/main">
   <p:cSld>
     <p:spTree>
@@ -6816,104 +6919,6 @@
     <p:extLst>
       <p:ext uri="{BB962C8B-B14F-4D97-AF65-F5344CB8AC3E}">
         <p14:creationId xmlns:p14="http://schemas.microsoft.com/office/powerpoint/2010/main" val="3966560941"/>
-      </p:ext>
-    </p:extLst>
-  </p:cSld>
-  <p:clrMapOvr>
-    <a:masterClrMapping/>
-  </p:clrMapOvr>
-</p:sld>
-</file>
-
-<file path=ppt/slides/slide21.xml><?xml version="1.0" encoding="utf-8"?>
-<p:sld xmlns:a="http://schemas.openxmlformats.org/drawingml/2006/main" xmlns:r="http://schemas.openxmlformats.org/officeDocument/2006/relationships" xmlns:p="http://schemas.openxmlformats.org/presentationml/2006/main">
-  <p:cSld>
-    <p:spTree>
-      <p:nvGrpSpPr>
-        <p:cNvPr id="1" name=""/>
-        <p:cNvGrpSpPr/>
-        <p:nvPr/>
-      </p:nvGrpSpPr>
-      <p:grpSpPr>
-        <a:xfrm>
-          <a:off x="0" y="0"/>
-          <a:ext cx="0" cy="0"/>
-          <a:chOff x="0" y="0"/>
-          <a:chExt cx="0" cy="0"/>
-        </a:xfrm>
-      </p:grpSpPr>
-      <p:sp>
-        <p:nvSpPr>
-          <p:cNvPr id="2" name="Title 1">
-            <a:extLst>
-              <a:ext uri="{FF2B5EF4-FFF2-40B4-BE49-F238E27FC236}">
-                <a16:creationId xmlns:a16="http://schemas.microsoft.com/office/drawing/2014/main" id="{D127F0A7-ED78-5F4A-AB40-E5E81442BFB6}"/>
-              </a:ext>
-            </a:extLst>
-          </p:cNvPr>
-          <p:cNvSpPr>
-            <a:spLocks noGrp="1"/>
-          </p:cNvSpPr>
-          <p:nvPr>
-            <p:ph type="title"/>
-          </p:nvPr>
-        </p:nvSpPr>
-        <p:spPr/>
-        <p:txBody>
-          <a:bodyPr/>
-          <a:lstStyle/>
-          <a:p>
-            <a:r>
-              <a:rPr lang="en-US"/>
-              <a:t>Reflect on the Activity</a:t>
-            </a:r>
-          </a:p>
-        </p:txBody>
-      </p:sp>
-      <p:sp>
-        <p:nvSpPr>
-          <p:cNvPr id="3" name="Content Placeholder 2">
-            <a:extLst>
-              <a:ext uri="{FF2B5EF4-FFF2-40B4-BE49-F238E27FC236}">
-                <a16:creationId xmlns:a16="http://schemas.microsoft.com/office/drawing/2014/main" id="{AD12C321-5B80-D843-85F3-BC9F939301CC}"/>
-              </a:ext>
-            </a:extLst>
-          </p:cNvPr>
-          <p:cNvSpPr>
-            <a:spLocks noGrp="1"/>
-          </p:cNvSpPr>
-          <p:nvPr>
-            <p:ph idx="1"/>
-          </p:nvPr>
-        </p:nvSpPr>
-        <p:spPr/>
-        <p:txBody>
-          <a:bodyPr/>
-          <a:lstStyle/>
-          <a:p>
-            <a:r>
-              <a:rPr lang="en-US"/>
-              <a:t>General thoughts on what we did.</a:t>
-            </a:r>
-          </a:p>
-          <a:p>
-            <a:r>
-              <a:rPr lang="en-US"/>
-              <a:t>Thoughts on other technical workshops they've been in.</a:t>
-            </a:r>
-          </a:p>
-          <a:p>
-            <a:r>
-              <a:rPr lang="en-US"/>
-              <a:t>Thoughts on the readings.</a:t>
-            </a:r>
-          </a:p>
-        </p:txBody>
-      </p:sp>
-    </p:spTree>
-    <p:extLst>
-      <p:ext uri="{BB962C8B-B14F-4D97-AF65-F5344CB8AC3E}">
-        <p14:creationId xmlns:p14="http://schemas.microsoft.com/office/powerpoint/2010/main" val="1509243918"/>
       </p:ext>
     </p:extLst>
   </p:cSld>
@@ -6990,32 +6995,20 @@
           <a:lstStyle/>
           <a:p>
             <a:r>
-              <a:rPr lang="en-US" dirty="0"/>
-              <a:t>Low risk of technical problems going wrong</a:t>
-            </a:r>
-          </a:p>
-          <a:p>
-            <a:r>
-              <a:rPr lang="en-US" dirty="0"/>
-              <a:t>Students don't need any programming to participate</a:t>
-            </a:r>
-          </a:p>
-          <a:p>
-            <a:r>
-              <a:rPr lang="en-US" dirty="0"/>
-              <a:t>Gets concepts across but the students arrive at them on their own</a:t>
-            </a:r>
-          </a:p>
-          <a:p>
-            <a:r>
-              <a:rPr lang="en-US" dirty="0"/>
-              <a:t>Now they'll know what the tools are doing, which removes one element of confusion when learning technical tasks.</a:t>
-            </a:r>
-          </a:p>
-          <a:p>
-            <a:r>
-              <a:rPr lang="en-US" dirty="0"/>
-              <a:t>Show them where to go next</a:t>
+              <a:rPr lang="en-US"/>
+              <a:t>General thoughts on what we did.</a:t>
+            </a:r>
+          </a:p>
+          <a:p>
+            <a:r>
+              <a:rPr lang="en-US"/>
+              <a:t>Thoughts on other technical workshops they've been in.</a:t>
+            </a:r>
+          </a:p>
+          <a:p>
+            <a:r>
+              <a:rPr lang="en-US"/>
+              <a:t>Thoughts on the readings.</a:t>
             </a:r>
           </a:p>
         </p:txBody>
@@ -7023,7 +7016,7 @@
     </p:spTree>
     <p:extLst>
       <p:ext uri="{BB962C8B-B14F-4D97-AF65-F5344CB8AC3E}">
-        <p14:creationId xmlns:p14="http://schemas.microsoft.com/office/powerpoint/2010/main" val="2338427982"/>
+        <p14:creationId xmlns:p14="http://schemas.microsoft.com/office/powerpoint/2010/main" val="1509243918"/>
       </p:ext>
     </p:extLst>
   </p:cSld>
@@ -7055,7 +7048,7 @@
           <p:cNvPr id="2" name="Title 1">
             <a:extLst>
               <a:ext uri="{FF2B5EF4-FFF2-40B4-BE49-F238E27FC236}">
-                <a16:creationId xmlns:a16="http://schemas.microsoft.com/office/drawing/2014/main" id="{719E81A8-FF1B-C345-AA4A-46946395F229}"/>
+                <a16:creationId xmlns:a16="http://schemas.microsoft.com/office/drawing/2014/main" id="{D127F0A7-ED78-5F4A-AB40-E5E81442BFB6}"/>
               </a:ext>
             </a:extLst>
           </p:cNvPr>
@@ -7073,7 +7066,7 @@
           <a:p>
             <a:r>
               <a:rPr lang="en-US"/>
-              <a:t>Workshop Assignment</a:t>
+              <a:t>Reflect on the Activity</a:t>
             </a:r>
           </a:p>
         </p:txBody>
@@ -7083,7 +7076,7 @@
           <p:cNvPr id="3" name="Content Placeholder 2">
             <a:extLst>
               <a:ext uri="{FF2B5EF4-FFF2-40B4-BE49-F238E27FC236}">
-                <a16:creationId xmlns:a16="http://schemas.microsoft.com/office/drawing/2014/main" id="{93BADEA3-2F02-1346-BCCA-17D92A5B3C67}"/>
+                <a16:creationId xmlns:a16="http://schemas.microsoft.com/office/drawing/2014/main" id="{AD12C321-5B80-D843-85F3-BC9F939301CC}"/>
               </a:ext>
             </a:extLst>
           </p:cNvPr>
@@ -7101,45 +7094,31 @@
           <a:p>
             <a:r>
               <a:rPr lang="en-US" dirty="0"/>
-              <a:t>Due Week of October 18th</a:t>
-            </a:r>
-          </a:p>
-          <a:p>
-            <a:r>
-              <a:rPr lang="en-US" dirty="0"/>
-              <a:t>Develop a low-tech, pencil and paper (</a:t>
-            </a:r>
-            <a:r>
-              <a:rPr lang="en-US" dirty="0" err="1"/>
-              <a:t>ish</a:t>
-            </a:r>
-            <a:r>
-              <a:rPr lang="en-US" dirty="0"/>
-              <a:t>) digital humanities workshop you could give soon based on your research interests.</a:t>
-            </a:r>
-          </a:p>
-          <a:p>
-            <a:r>
-              <a:rPr lang="en-US" dirty="0"/>
-              <a:t>Use it as an opportunity to teach to learn.</a:t>
-            </a:r>
-          </a:p>
-          <a:p>
-            <a:r>
-              <a:rPr lang="en-US" dirty="0"/>
-              <a:t>Be thinking of the how this connects to the project.</a:t>
-            </a:r>
-          </a:p>
-          <a:p>
-            <a:r>
-              <a:rPr lang="en-US" dirty="0"/>
-              <a:t>Work with others on your ideas</a:t>
-            </a:r>
-          </a:p>
-          <a:p>
-            <a:r>
-              <a:rPr lang="en-US" dirty="0"/>
-              <a:t>Outcome is a blog post</a:t>
+              <a:t>Low risk of technical problems going wrong</a:t>
+            </a:r>
+          </a:p>
+          <a:p>
+            <a:r>
+              <a:rPr lang="en-US" dirty="0"/>
+              <a:t>Students don't need any programming to participate</a:t>
+            </a:r>
+          </a:p>
+          <a:p>
+            <a:r>
+              <a:rPr lang="en-US" dirty="0"/>
+              <a:t>Gets concepts across but the students arrive at them on their own</a:t>
+            </a:r>
+          </a:p>
+          <a:p>
+            <a:r>
+              <a:rPr lang="en-US" dirty="0"/>
+              <a:t>Now they'll know what the tools are doing, which removes one element of confusion when learning technical tasks.</a:t>
+            </a:r>
+          </a:p>
+          <a:p>
+            <a:r>
+              <a:rPr lang="en-US" dirty="0"/>
+              <a:t>Show them where to go next</a:t>
             </a:r>
           </a:p>
         </p:txBody>
@@ -7147,7 +7126,7 @@
     </p:spTree>
     <p:extLst>
       <p:ext uri="{BB962C8B-B14F-4D97-AF65-F5344CB8AC3E}">
-        <p14:creationId xmlns:p14="http://schemas.microsoft.com/office/powerpoint/2010/main" val="1909780717"/>
+        <p14:creationId xmlns:p14="http://schemas.microsoft.com/office/powerpoint/2010/main" val="2338427982"/>
       </p:ext>
     </p:extLst>
   </p:cSld>
@@ -7179,7 +7158,7 @@
           <p:cNvPr id="2" name="Title 1">
             <a:extLst>
               <a:ext uri="{FF2B5EF4-FFF2-40B4-BE49-F238E27FC236}">
-                <a16:creationId xmlns:a16="http://schemas.microsoft.com/office/drawing/2014/main" id="{F778836A-906F-E54A-8420-B19EB122E912}"/>
+                <a16:creationId xmlns:a16="http://schemas.microsoft.com/office/drawing/2014/main" id="{719E81A8-FF1B-C345-AA4A-46946395F229}"/>
               </a:ext>
             </a:extLst>
           </p:cNvPr>
@@ -7197,7 +7176,7 @@
           <a:p>
             <a:r>
               <a:rPr lang="en-US"/>
-              <a:t>Reading / Homework</a:t>
+              <a:t>Workshop Assignment</a:t>
             </a:r>
           </a:p>
         </p:txBody>
@@ -7207,7 +7186,7 @@
           <p:cNvPr id="3" name="Content Placeholder 2">
             <a:extLst>
               <a:ext uri="{FF2B5EF4-FFF2-40B4-BE49-F238E27FC236}">
-                <a16:creationId xmlns:a16="http://schemas.microsoft.com/office/drawing/2014/main" id="{C959CF34-3B0D-B24F-B1BE-B3F59FD7C982}"/>
+                <a16:creationId xmlns:a16="http://schemas.microsoft.com/office/drawing/2014/main" id="{93BADEA3-2F02-1346-BCCA-17D92A5B3C67}"/>
               </a:ext>
             </a:extLst>
           </p:cNvPr>
@@ -7225,46 +7204,39 @@
           <a:p>
             <a:r>
               <a:rPr lang="en-US" dirty="0"/>
-              <a:t>Think about what kind of method or concept you want as part of your profile</a:t>
-            </a:r>
-          </a:p>
-          <a:p>
-            <a:r>
-              <a:rPr lang="en-US" dirty="0"/>
-              <a:t>Think through how it might relate to your own…</a:t>
-            </a:r>
-          </a:p>
-          <a:p>
-            <a:pPr lvl="1"/>
-            <a:r>
-              <a:rPr lang="en-US" dirty="0"/>
-              <a:t>Research</a:t>
-            </a:r>
-          </a:p>
-          <a:p>
-            <a:pPr lvl="1"/>
-            <a:r>
-              <a:rPr lang="en-US" dirty="0"/>
-              <a:t>Workshop</a:t>
-            </a:r>
-          </a:p>
-          <a:p>
-            <a:pPr lvl="1"/>
-            <a:r>
-              <a:rPr lang="en-US" dirty="0"/>
-              <a:t>DH Education project</a:t>
-            </a:r>
-          </a:p>
-          <a:p>
-            <a:r>
-              <a:rPr lang="en-US" dirty="0"/>
-              <a:t>Start brainstorming workshop ideas. </a:t>
-            </a:r>
-          </a:p>
-          <a:p>
-            <a:r>
-              <a:rPr lang="en-US" dirty="0"/>
-              <a:t>Talk to me – I can poke you in a direction</a:t>
+              <a:t>Due Week of November 28th</a:t>
+            </a:r>
+          </a:p>
+          <a:p>
+            <a:r>
+              <a:rPr lang="en-US" dirty="0"/>
+              <a:t>Develop a low-tech, pencil and paper (</a:t>
+            </a:r>
+            <a:r>
+              <a:rPr lang="en-US" dirty="0" err="1"/>
+              <a:t>ish</a:t>
+            </a:r>
+            <a:r>
+              <a:rPr lang="en-US" dirty="0"/>
+              <a:t>) digital humanities workshop you could give soon based on your research interests.</a:t>
+            </a:r>
+          </a:p>
+          <a:p>
+            <a:r>
+              <a:rPr lang="en-US" dirty="0"/>
+              <a:t>Use it as an opportunity to teach to learn.</a:t>
+            </a:r>
+          </a:p>
+          <a:p>
+            <a:r>
+              <a:rPr lang="en-US" dirty="0"/>
+              <a:t>Work with others on your ideas</a:t>
+            </a:r>
+          </a:p>
+          <a:p>
+            <a:r>
+              <a:rPr lang="en-US" dirty="0"/>
+              <a:t>Outcome is a blog post</a:t>
             </a:r>
           </a:p>
         </p:txBody>
@@ -7272,7 +7244,7 @@
     </p:spTree>
     <p:extLst>
       <p:ext uri="{BB962C8B-B14F-4D97-AF65-F5344CB8AC3E}">
-        <p14:creationId xmlns:p14="http://schemas.microsoft.com/office/powerpoint/2010/main" val="643085182"/>
+        <p14:creationId xmlns:p14="http://schemas.microsoft.com/office/powerpoint/2010/main" val="1909780717"/>
       </p:ext>
     </p:extLst>
   </p:cSld>
@@ -7304,6 +7276,131 @@
           <p:cNvPr id="2" name="Title 1">
             <a:extLst>
               <a:ext uri="{FF2B5EF4-FFF2-40B4-BE49-F238E27FC236}">
+                <a16:creationId xmlns:a16="http://schemas.microsoft.com/office/drawing/2014/main" id="{F778836A-906F-E54A-8420-B19EB122E912}"/>
+              </a:ext>
+            </a:extLst>
+          </p:cNvPr>
+          <p:cNvSpPr>
+            <a:spLocks noGrp="1"/>
+          </p:cNvSpPr>
+          <p:nvPr>
+            <p:ph type="title"/>
+          </p:nvPr>
+        </p:nvSpPr>
+        <p:spPr/>
+        <p:txBody>
+          <a:bodyPr/>
+          <a:lstStyle/>
+          <a:p>
+            <a:r>
+              <a:rPr lang="en-US"/>
+              <a:t>Reading / Homework</a:t>
+            </a:r>
+          </a:p>
+        </p:txBody>
+      </p:sp>
+      <p:sp>
+        <p:nvSpPr>
+          <p:cNvPr id="3" name="Content Placeholder 2">
+            <a:extLst>
+              <a:ext uri="{FF2B5EF4-FFF2-40B4-BE49-F238E27FC236}">
+                <a16:creationId xmlns:a16="http://schemas.microsoft.com/office/drawing/2014/main" id="{C959CF34-3B0D-B24F-B1BE-B3F59FD7C982}"/>
+              </a:ext>
+            </a:extLst>
+          </p:cNvPr>
+          <p:cNvSpPr>
+            <a:spLocks noGrp="1"/>
+          </p:cNvSpPr>
+          <p:nvPr>
+            <p:ph idx="1"/>
+          </p:nvPr>
+        </p:nvSpPr>
+        <p:spPr/>
+        <p:txBody>
+          <a:bodyPr/>
+          <a:lstStyle/>
+          <a:p>
+            <a:r>
+              <a:rPr lang="en-US" dirty="0"/>
+              <a:t>Think about what kind of method or concept you want as part of your profile</a:t>
+            </a:r>
+          </a:p>
+          <a:p>
+            <a:r>
+              <a:rPr lang="en-US" dirty="0"/>
+              <a:t>Think through how it might relate to your own…</a:t>
+            </a:r>
+          </a:p>
+          <a:p>
+            <a:pPr lvl="1"/>
+            <a:r>
+              <a:rPr lang="en-US" dirty="0"/>
+              <a:t>Research</a:t>
+            </a:r>
+          </a:p>
+          <a:p>
+            <a:pPr lvl="1"/>
+            <a:r>
+              <a:rPr lang="en-US" dirty="0"/>
+              <a:t>Workshop</a:t>
+            </a:r>
+          </a:p>
+          <a:p>
+            <a:pPr lvl="1"/>
+            <a:r>
+              <a:rPr lang="en-US" dirty="0"/>
+              <a:t>DH Education project</a:t>
+            </a:r>
+          </a:p>
+          <a:p>
+            <a:r>
+              <a:rPr lang="en-US" dirty="0"/>
+              <a:t>Start brainstorming workshop ideas. </a:t>
+            </a:r>
+          </a:p>
+          <a:p>
+            <a:r>
+              <a:rPr lang="en-US" dirty="0"/>
+              <a:t>Talk to me – I can poke you in a direction</a:t>
+            </a:r>
+          </a:p>
+        </p:txBody>
+      </p:sp>
+    </p:spTree>
+    <p:extLst>
+      <p:ext uri="{BB962C8B-B14F-4D97-AF65-F5344CB8AC3E}">
+        <p14:creationId xmlns:p14="http://schemas.microsoft.com/office/powerpoint/2010/main" val="643085182"/>
+      </p:ext>
+    </p:extLst>
+  </p:cSld>
+  <p:clrMapOvr>
+    <a:masterClrMapping/>
+  </p:clrMapOvr>
+</p:sld>
+</file>
+
+<file path=ppt/slides/slide26.xml><?xml version="1.0" encoding="utf-8"?>
+<p:sld xmlns:a="http://schemas.openxmlformats.org/drawingml/2006/main" xmlns:r="http://schemas.openxmlformats.org/officeDocument/2006/relationships" xmlns:p="http://schemas.openxmlformats.org/presentationml/2006/main">
+  <p:cSld>
+    <p:spTree>
+      <p:nvGrpSpPr>
+        <p:cNvPr id="1" name=""/>
+        <p:cNvGrpSpPr/>
+        <p:nvPr/>
+      </p:nvGrpSpPr>
+      <p:grpSpPr>
+        <a:xfrm>
+          <a:off x="0" y="0"/>
+          <a:ext cx="0" cy="0"/>
+          <a:chOff x="0" y="0"/>
+          <a:chExt cx="0" cy="0"/>
+        </a:xfrm>
+      </p:grpSpPr>
+      <p:sp>
+        <p:nvSpPr>
+          <p:cNvPr id="2" name="Title 1">
+            <a:extLst>
+              <a:ext uri="{FF2B5EF4-FFF2-40B4-BE49-F238E27FC236}">
                 <a16:creationId xmlns:a16="http://schemas.microsoft.com/office/drawing/2014/main" id="{17F93419-A0D5-8D4E-A4A8-A72713A004A8}"/>
               </a:ext>
             </a:extLst>
@@ -7322,7 +7419,7 @@
           <a:p>
             <a:r>
               <a:rPr lang="en-US" dirty="0"/>
-              <a:t>Resources to Get You Started</a:t>
+              <a:t>Getting Started</a:t>
             </a:r>
           </a:p>
         </p:txBody>
@@ -7351,57 +7448,36 @@
             <a:pPr fontAlgn="base"/>
             <a:r>
               <a:rPr lang="en-US" dirty="0"/>
-              <a:t>Disciplinary DH assignment</a:t>
+              <a:t>Monday</a:t>
             </a:r>
           </a:p>
           <a:p>
             <a:pPr lvl="1" fontAlgn="base"/>
             <a:r>
               <a:rPr lang="en-US" dirty="0"/>
-              <a:t>Come in with 2-3 projects from your discipline (broadly construed!), some of which connect to your interests for discussion.</a:t>
+              <a:t>Going to be talking with Mackenzie Brooks from Washington and Lee</a:t>
+            </a:r>
+          </a:p>
+          <a:p>
+            <a:pPr lvl="2" fontAlgn="base"/>
+            <a:r>
+              <a:rPr lang="en-US" dirty="0"/>
+              <a:t>Come with a couple questions each for her about DH and teaching, DH work at a SLAC, etc. based on your reading and experiences </a:t>
+            </a:r>
+            <a:r>
+              <a:rPr lang="en-US" dirty="0" err="1"/>
+              <a:t>thusfar</a:t>
+            </a:r>
+            <a:r>
+              <a:rPr lang="en-US" dirty="0"/>
+              <a:t>.</a:t>
             </a:r>
           </a:p>
           <a:p>
             <a:pPr lvl="1" fontAlgn="base"/>
             <a:r>
               <a:rPr lang="en-US" dirty="0"/>
-              <a:t>Digital Pedagogy in the Humanities and Reviews in </a:t>
-            </a:r>
-            <a:r>
-              <a:rPr lang="en-US" dirty="0" err="1"/>
-              <a:t>DHcan</a:t>
-            </a:r>
-            <a:r>
-              <a:rPr lang="en-US" dirty="0"/>
-              <a:t> be a way in for those projects</a:t>
-            </a:r>
-          </a:p>
-          <a:p>
-            <a:pPr lvl="1" fontAlgn="base"/>
-            <a:r>
-              <a:rPr lang="en-US" dirty="0"/>
-              <a:t>I can also help you find things – ping me</a:t>
-            </a:r>
-          </a:p>
-          <a:p>
-            <a:pPr lvl="1" fontAlgn="base"/>
-            <a:r>
-              <a:rPr lang="en-US" dirty="0"/>
-              <a:t>Be prepared to chat about what you find. </a:t>
-            </a:r>
-          </a:p>
-          <a:p>
-            <a:pPr fontAlgn="base"/>
-            <a:r>
-              <a:rPr lang="en-US" dirty="0"/>
-              <a:t>Readings Assigned</a:t>
-            </a:r>
-          </a:p>
-          <a:p>
-            <a:pPr lvl="1" fontAlgn="base"/>
-            <a:r>
-              <a:rPr lang="en-US" dirty="0"/>
-              <a:t>Explore 2-3 things in </a:t>
+              <a:t>Explore 2-3 categories in </a:t>
             </a:r>
             <a:r>
               <a:rPr lang="en-US" dirty="0">
@@ -7411,7 +7487,7 @@
             </a:r>
             <a:r>
               <a:rPr lang="en-US" dirty="0"/>
-              <a:t> that are useful for your interests.</a:t>
+              <a:t> that are useful for your interests and use them to begin thinking about your workshops.</a:t>
             </a:r>
           </a:p>
         </p:txBody>
@@ -7499,7 +7575,7 @@
           <a:p>
             <a:r>
               <a:rPr lang="en-US" dirty="0"/>
-              <a:t>“Due” October 18th</a:t>
+              <a:t>Due November 28th</a:t>
             </a:r>
           </a:p>
           <a:p>
@@ -7520,12 +7596,6 @@
             <a:r>
               <a:rPr lang="en-US" dirty="0"/>
               <a:t>) digital humanities workshop you could give soon based on your research interests.</a:t>
-            </a:r>
-          </a:p>
-          <a:p>
-            <a:r>
-              <a:rPr lang="en-US" dirty="0"/>
-              <a:t>Be thinking of connections to the project.</a:t>
             </a:r>
           </a:p>
           <a:p>
@@ -7578,78 +7648,40 @@
           <a:chExt cx="0" cy="0"/>
         </a:xfrm>
       </p:grpSpPr>
-      <p:sp>
-        <p:nvSpPr>
-          <p:cNvPr id="2" name="Title 1">
-            <a:extLst>
-              <a:ext uri="{FF2B5EF4-FFF2-40B4-BE49-F238E27FC236}">
-                <a16:creationId xmlns:a16="http://schemas.microsoft.com/office/drawing/2014/main" id="{6AA8E53E-300C-8B48-B452-4A45CEB82A5E}"/>
-              </a:ext>
-            </a:extLst>
-          </p:cNvPr>
-          <p:cNvSpPr>
-            <a:spLocks noGrp="1"/>
-          </p:cNvSpPr>
-          <p:nvPr>
-            <p:ph type="title"/>
-          </p:nvPr>
-        </p:nvSpPr>
-        <p:spPr/>
-        <p:txBody>
-          <a:bodyPr/>
-          <a:lstStyle/>
-          <a:p>
-            <a:r>
-              <a:rPr lang="en-US"/>
-              <a:t>Buttonology</a:t>
-            </a:r>
-          </a:p>
-        </p:txBody>
-      </p:sp>
-      <p:sp>
-        <p:nvSpPr>
-          <p:cNvPr id="3" name="Content Placeholder 2">
-            <a:extLst>
-              <a:ext uri="{FF2B5EF4-FFF2-40B4-BE49-F238E27FC236}">
-                <a16:creationId xmlns:a16="http://schemas.microsoft.com/office/drawing/2014/main" id="{27E63EB3-264B-D74C-AA8B-51D5DEFD889A}"/>
-              </a:ext>
-            </a:extLst>
-          </p:cNvPr>
-          <p:cNvSpPr>
-            <a:spLocks noGrp="1"/>
-          </p:cNvSpPr>
-          <p:nvPr>
-            <p:ph idx="1"/>
-          </p:nvPr>
-        </p:nvSpPr>
-        <p:spPr/>
-        <p:txBody>
-          <a:bodyPr/>
-          <a:lstStyle/>
-          <a:p>
-            <a:r>
-              <a:rPr lang="en-US"/>
-              <a:t>"Knowing how to upload texts into a tool like Voyant does not help researchers think about what texts should be uploaded, how selecting data relates to a research question, or even what constitutes an effective research question." </a:t>
-            </a:r>
-          </a:p>
-          <a:p>
-            <a:r>
-              <a:rPr lang="en-US"/>
-              <a:t>"Beyond Buttonology: Digital Humanities, Digital Pedagogy, and the ACRL Framework" – John E. Russell and Merinda Kaye Hensley</a:t>
-            </a:r>
-          </a:p>
-          <a:p>
-            <a:r>
-              <a:rPr lang="en-US"/>
-              <a:t>That's the provocation for this unit.</a:t>
-            </a:r>
-          </a:p>
-        </p:txBody>
-      </p:sp>
+      <p:pic>
+        <p:nvPicPr>
+          <p:cNvPr id="5" name="Picture 4">
+            <a:extLst>
+              <a:ext uri="{FF2B5EF4-FFF2-40B4-BE49-F238E27FC236}">
+                <a16:creationId xmlns:a16="http://schemas.microsoft.com/office/drawing/2014/main" id="{50589EB0-6428-7C37-BCBD-415CDEA08407}"/>
+              </a:ext>
+            </a:extLst>
+          </p:cNvPr>
+          <p:cNvPicPr>
+            <a:picLocks noChangeAspect="1"/>
+          </p:cNvPicPr>
+          <p:nvPr/>
+        </p:nvPicPr>
+        <p:blipFill>
+          <a:blip r:embed="rId2"/>
+          <a:stretch>
+            <a:fillRect/>
+          </a:stretch>
+        </p:blipFill>
+        <p:spPr>
+          <a:xfrm>
+            <a:off x="609600" y="0"/>
+            <a:ext cx="10922000" cy="6826250"/>
+          </a:xfrm>
+          <a:prstGeom prst="rect">
+            <a:avLst/>
+          </a:prstGeom>
+        </p:spPr>
+      </p:pic>
     </p:spTree>
     <p:extLst>
       <p:ext uri="{BB962C8B-B14F-4D97-AF65-F5344CB8AC3E}">
-        <p14:creationId xmlns:p14="http://schemas.microsoft.com/office/powerpoint/2010/main" val="3706249178"/>
+        <p14:creationId xmlns:p14="http://schemas.microsoft.com/office/powerpoint/2010/main" val="1962907834"/>
       </p:ext>
     </p:extLst>
   </p:cSld>
@@ -7681,7 +7713,7 @@
           <p:cNvPr id="2" name="Title 1">
             <a:extLst>
               <a:ext uri="{FF2B5EF4-FFF2-40B4-BE49-F238E27FC236}">
-                <a16:creationId xmlns:a16="http://schemas.microsoft.com/office/drawing/2014/main" id="{28B530D9-967D-054D-86B5-AB5AF941D1BA}"/>
+                <a16:creationId xmlns:a16="http://schemas.microsoft.com/office/drawing/2014/main" id="{6AA8E53E-300C-8B48-B452-4A45CEB82A5E}"/>
               </a:ext>
             </a:extLst>
           </p:cNvPr>
@@ -7698,8 +7730,8 @@
           <a:lstStyle/>
           <a:p>
             <a:r>
-              <a:rPr lang="en-US" dirty="0"/>
-              <a:t>Example Workshop – Ways to Read a Text</a:t>
+              <a:rPr lang="en-US"/>
+              <a:t>Buttonology</a:t>
             </a:r>
           </a:p>
         </p:txBody>
@@ -7709,7 +7741,7 @@
           <p:cNvPr id="3" name="Content Placeholder 2">
             <a:extLst>
               <a:ext uri="{FF2B5EF4-FFF2-40B4-BE49-F238E27FC236}">
-                <a16:creationId xmlns:a16="http://schemas.microsoft.com/office/drawing/2014/main" id="{E597B1E2-2699-B345-A3F9-45825038A454}"/>
+                <a16:creationId xmlns:a16="http://schemas.microsoft.com/office/drawing/2014/main" id="{27E63EB3-264B-D74C-AA8B-51D5DEFD889A}"/>
               </a:ext>
             </a:extLst>
           </p:cNvPr>
@@ -7726,45 +7758,20 @@
           <a:lstStyle/>
           <a:p>
             <a:r>
-              <a:rPr lang="en-US" dirty="0"/>
-              <a:t>One-shot workshop that I can use for variable amounts of time</a:t>
-            </a:r>
-          </a:p>
-          <a:p>
-            <a:r>
-              <a:rPr lang="en-US" dirty="0"/>
-              <a:t>Uses basically no technology but </a:t>
-            </a:r>
-            <a:r>
-              <a:rPr lang="en-US" dirty="0" err="1"/>
-              <a:t>powerpoint</a:t>
-            </a:r>
-            <a:endParaRPr lang="en-US" dirty="0"/>
-          </a:p>
-          <a:p>
-            <a:r>
-              <a:rPr lang="en-US" dirty="0"/>
-              <a:t>Basically it's text analysis with pen and paper</a:t>
-            </a:r>
-          </a:p>
-          <a:p>
-            <a:r>
-              <a:rPr lang="en-US" dirty="0"/>
-              <a:t>In what follows, you’ll get a micro-version of the workshop and then we’ll reflect on the pedagogy behind it together</a:t>
-            </a:r>
-          </a:p>
-          <a:p>
-            <a:r>
-              <a:rPr lang="en-US" dirty="0"/>
-              <a:t>Can find it written up here - https://</a:t>
-            </a:r>
-            <a:r>
-              <a:rPr lang="en-US" dirty="0" err="1"/>
-              <a:t>walshbr.com</a:t>
-            </a:r>
-            <a:r>
-              <a:rPr lang="en-US" dirty="0"/>
-              <a:t>/blog/ways-to-read/</a:t>
+              <a:rPr lang="en-US"/>
+              <a:t>"Knowing how to upload texts into a tool like Voyant does not help researchers think about what texts should be uploaded, how selecting data relates to a research question, or even what constitutes an effective research question." </a:t>
+            </a:r>
+          </a:p>
+          <a:p>
+            <a:r>
+              <a:rPr lang="en-US"/>
+              <a:t>"Beyond Buttonology: Digital Humanities, Digital Pedagogy, and the ACRL Framework" – John E. Russell and Merinda Kaye Hensley</a:t>
+            </a:r>
+          </a:p>
+          <a:p>
+            <a:r>
+              <a:rPr lang="en-US"/>
+              <a:t>That's the provocation for this unit.</a:t>
             </a:r>
           </a:p>
         </p:txBody>
@@ -7772,7 +7779,7 @@
     </p:spTree>
     <p:extLst>
       <p:ext uri="{BB962C8B-B14F-4D97-AF65-F5344CB8AC3E}">
-        <p14:creationId xmlns:p14="http://schemas.microsoft.com/office/powerpoint/2010/main" val="3052535468"/>
+        <p14:creationId xmlns:p14="http://schemas.microsoft.com/office/powerpoint/2010/main" val="3706249178"/>
       </p:ext>
     </p:extLst>
   </p:cSld>
@@ -7804,7 +7811,7 @@
           <p:cNvPr id="2" name="Title 1">
             <a:extLst>
               <a:ext uri="{FF2B5EF4-FFF2-40B4-BE49-F238E27FC236}">
-                <a16:creationId xmlns:a16="http://schemas.microsoft.com/office/drawing/2014/main" id="{05192C54-6A19-934F-AEC8-6122064F5321}"/>
+                <a16:creationId xmlns:a16="http://schemas.microsoft.com/office/drawing/2014/main" id="{28B530D9-967D-054D-86B5-AB5AF941D1BA}"/>
               </a:ext>
             </a:extLst>
           </p:cNvPr>
@@ -7822,7 +7829,7 @@
           <a:p>
             <a:r>
               <a:rPr lang="en-US" dirty="0"/>
-              <a:t>Embedded Workshop Starts here</a:t>
+              <a:t>Example Workshop – Ways to Read a Text</a:t>
             </a:r>
           </a:p>
         </p:txBody>
@@ -7832,7 +7839,7 @@
           <p:cNvPr id="3" name="Content Placeholder 2">
             <a:extLst>
               <a:ext uri="{FF2B5EF4-FFF2-40B4-BE49-F238E27FC236}">
-                <a16:creationId xmlns:a16="http://schemas.microsoft.com/office/drawing/2014/main" id="{2D2221DF-E173-E140-B562-CDC304DEEFC1}"/>
+                <a16:creationId xmlns:a16="http://schemas.microsoft.com/office/drawing/2014/main" id="{E597B1E2-2699-B345-A3F9-45825038A454}"/>
               </a:ext>
             </a:extLst>
           </p:cNvPr>
@@ -7850,40 +7857,44 @@
           <a:p>
             <a:r>
               <a:rPr lang="en-US" dirty="0"/>
-              <a:t>Slides start here!</a:t>
-            </a:r>
-          </a:p>
-          <a:p>
-            <a:r>
-              <a:rPr lang="en-US" dirty="0"/>
-              <a:t>At this point in the original iteration, I had already introduced:</a:t>
-            </a:r>
-          </a:p>
-          <a:p>
-            <a:pPr lvl="1"/>
-            <a:r>
-              <a:rPr lang="en-US" dirty="0"/>
-              <a:t>Close reading (literary interpretation by paying attention to the text)</a:t>
-            </a:r>
-          </a:p>
-          <a:p>
-            <a:pPr lvl="1"/>
-            <a:r>
-              <a:rPr lang="en-US" dirty="0"/>
-              <a:t>Bag of words approaches to texts (basically just issues in word counting as a computer would do it)</a:t>
-            </a:r>
-          </a:p>
-          <a:p>
-            <a:pPr lvl="1"/>
-            <a:r>
-              <a:rPr lang="en-US" dirty="0"/>
-              <a:t>Now moving into how a computer can do more complicated forms of analysis.</a:t>
-            </a:r>
-          </a:p>
-          <a:p>
-            <a:r>
-              <a:rPr lang="en-US" dirty="0"/>
-              <a:t>But also works as a standalone</a:t>
+              <a:t>One-shot workshop that I can use for variable amounts of time</a:t>
+            </a:r>
+          </a:p>
+          <a:p>
+            <a:r>
+              <a:rPr lang="en-US" dirty="0"/>
+              <a:t>Uses basically no technology but </a:t>
+            </a:r>
+            <a:r>
+              <a:rPr lang="en-US" dirty="0" err="1"/>
+              <a:t>powerpoint</a:t>
+            </a:r>
+            <a:endParaRPr lang="en-US" dirty="0"/>
+          </a:p>
+          <a:p>
+            <a:r>
+              <a:rPr lang="en-US" dirty="0"/>
+              <a:t>Basically it's text analysis with pen and paper</a:t>
+            </a:r>
+          </a:p>
+          <a:p>
+            <a:r>
+              <a:rPr lang="en-US" dirty="0"/>
+              <a:t>In what follows, you’ll get a micro-version of the workshop and then we’ll reflect on the pedagogy behind it together</a:t>
+            </a:r>
+          </a:p>
+          <a:p>
+            <a:r>
+              <a:rPr lang="en-US" dirty="0"/>
+              <a:t>Can find it written up here - https://</a:t>
+            </a:r>
+            <a:r>
+              <a:rPr lang="en-US" dirty="0" err="1"/>
+              <a:t>walshbr.com</a:t>
+            </a:r>
+            <a:r>
+              <a:rPr lang="en-US" dirty="0"/>
+              <a:t>/blog/ways-to-read/</a:t>
             </a:r>
           </a:p>
         </p:txBody>
@@ -7891,7 +7902,7 @@
     </p:spTree>
     <p:extLst>
       <p:ext uri="{BB962C8B-B14F-4D97-AF65-F5344CB8AC3E}">
-        <p14:creationId xmlns:p14="http://schemas.microsoft.com/office/powerpoint/2010/main" val="4294531726"/>
+        <p14:creationId xmlns:p14="http://schemas.microsoft.com/office/powerpoint/2010/main" val="3052535468"/>
       </p:ext>
     </p:extLst>
   </p:cSld>
@@ -7918,6 +7929,125 @@
           <a:chExt cx="0" cy="0"/>
         </a:xfrm>
       </p:grpSpPr>
+      <p:sp>
+        <p:nvSpPr>
+          <p:cNvPr id="2" name="Title 1">
+            <a:extLst>
+              <a:ext uri="{FF2B5EF4-FFF2-40B4-BE49-F238E27FC236}">
+                <a16:creationId xmlns:a16="http://schemas.microsoft.com/office/drawing/2014/main" id="{05192C54-6A19-934F-AEC8-6122064F5321}"/>
+              </a:ext>
+            </a:extLst>
+          </p:cNvPr>
+          <p:cNvSpPr>
+            <a:spLocks noGrp="1"/>
+          </p:cNvSpPr>
+          <p:nvPr>
+            <p:ph type="title"/>
+          </p:nvPr>
+        </p:nvSpPr>
+        <p:spPr/>
+        <p:txBody>
+          <a:bodyPr/>
+          <a:lstStyle/>
+          <a:p>
+            <a:r>
+              <a:rPr lang="en-US" dirty="0"/>
+              <a:t>Embedded Workshop Starts here</a:t>
+            </a:r>
+          </a:p>
+        </p:txBody>
+      </p:sp>
+      <p:sp>
+        <p:nvSpPr>
+          <p:cNvPr id="3" name="Content Placeholder 2">
+            <a:extLst>
+              <a:ext uri="{FF2B5EF4-FFF2-40B4-BE49-F238E27FC236}">
+                <a16:creationId xmlns:a16="http://schemas.microsoft.com/office/drawing/2014/main" id="{2D2221DF-E173-E140-B562-CDC304DEEFC1}"/>
+              </a:ext>
+            </a:extLst>
+          </p:cNvPr>
+          <p:cNvSpPr>
+            <a:spLocks noGrp="1"/>
+          </p:cNvSpPr>
+          <p:nvPr>
+            <p:ph idx="1"/>
+          </p:nvPr>
+        </p:nvSpPr>
+        <p:spPr/>
+        <p:txBody>
+          <a:bodyPr/>
+          <a:lstStyle/>
+          <a:p>
+            <a:r>
+              <a:rPr lang="en-US" dirty="0"/>
+              <a:t>Slides start here!</a:t>
+            </a:r>
+          </a:p>
+          <a:p>
+            <a:r>
+              <a:rPr lang="en-US" dirty="0"/>
+              <a:t>At this point in the original iteration, I had already introduced:</a:t>
+            </a:r>
+          </a:p>
+          <a:p>
+            <a:pPr lvl="1"/>
+            <a:r>
+              <a:rPr lang="en-US" dirty="0"/>
+              <a:t>Close reading (literary interpretation by paying attention to the text)</a:t>
+            </a:r>
+          </a:p>
+          <a:p>
+            <a:pPr lvl="1"/>
+            <a:r>
+              <a:rPr lang="en-US" dirty="0"/>
+              <a:t>Bag of words approaches to texts (basically just issues in word counting as a computer would do it)</a:t>
+            </a:r>
+          </a:p>
+          <a:p>
+            <a:pPr lvl="1"/>
+            <a:r>
+              <a:rPr lang="en-US" dirty="0"/>
+              <a:t>Now moving into how a computer can do more complicated forms of analysis.</a:t>
+            </a:r>
+          </a:p>
+          <a:p>
+            <a:r>
+              <a:rPr lang="en-US" dirty="0"/>
+              <a:t>But also works as a standalone</a:t>
+            </a:r>
+          </a:p>
+        </p:txBody>
+      </p:sp>
+    </p:spTree>
+    <p:extLst>
+      <p:ext uri="{BB962C8B-B14F-4D97-AF65-F5344CB8AC3E}">
+        <p14:creationId xmlns:p14="http://schemas.microsoft.com/office/powerpoint/2010/main" val="4294531726"/>
+      </p:ext>
+    </p:extLst>
+  </p:cSld>
+  <p:clrMapOvr>
+    <a:masterClrMapping/>
+  </p:clrMapOvr>
+</p:sld>
+</file>
+
+<file path=ppt/slides/slide8.xml><?xml version="1.0" encoding="utf-8"?>
+<p:sld xmlns:a="http://schemas.openxmlformats.org/drawingml/2006/main" xmlns:r="http://schemas.openxmlformats.org/officeDocument/2006/relationships" xmlns:p="http://schemas.openxmlformats.org/presentationml/2006/main">
+  <p:cSld>
+    <p:spTree>
+      <p:nvGrpSpPr>
+        <p:cNvPr id="1" name=""/>
+        <p:cNvGrpSpPr/>
+        <p:nvPr/>
+      </p:nvGrpSpPr>
+      <p:grpSpPr>
+        <a:xfrm>
+          <a:off x="0" y="0"/>
+          <a:ext cx="0" cy="0"/>
+          <a:chOff x="0" y="0"/>
+          <a:chExt cx="0" cy="0"/>
+        </a:xfrm>
+      </p:grpSpPr>
       <p:pic>
         <p:nvPicPr>
           <p:cNvPr id="2050" name="Picture 2" descr="empty grid">
@@ -8020,7 +8150,7 @@
 </p:sld>
 </file>
 
-<file path=ppt/slides/slide8.xml><?xml version="1.0" encoding="utf-8"?>
+<file path=ppt/slides/slide9.xml><?xml version="1.0" encoding="utf-8"?>
 <p:sld xmlns:a="http://schemas.openxmlformats.org/drawingml/2006/main" xmlns:r="http://schemas.openxmlformats.org/officeDocument/2006/relationships" xmlns:p="http://schemas.openxmlformats.org/presentationml/2006/main">
   <p:cSld>
     <p:spTree>
@@ -8088,98 +8218,6 @@
     <p:extLst>
       <p:ext uri="{BB962C8B-B14F-4D97-AF65-F5344CB8AC3E}">
         <p14:creationId xmlns:p14="http://schemas.microsoft.com/office/powerpoint/2010/main" val="3636946356"/>
-      </p:ext>
-    </p:extLst>
-  </p:cSld>
-  <p:clrMapOvr>
-    <a:masterClrMapping/>
-  </p:clrMapOvr>
-</p:sld>
-</file>
-
-<file path=ppt/slides/slide9.xml><?xml version="1.0" encoding="utf-8"?>
-<p:sld xmlns:a="http://schemas.openxmlformats.org/drawingml/2006/main" xmlns:r="http://schemas.openxmlformats.org/officeDocument/2006/relationships" xmlns:p="http://schemas.openxmlformats.org/presentationml/2006/main">
-  <p:cSld>
-    <p:spTree>
-      <p:nvGrpSpPr>
-        <p:cNvPr id="1" name=""/>
-        <p:cNvGrpSpPr/>
-        <p:nvPr/>
-      </p:nvGrpSpPr>
-      <p:grpSpPr>
-        <a:xfrm>
-          <a:off x="0" y="0"/>
-          <a:ext cx="0" cy="0"/>
-          <a:chOff x="0" y="0"/>
-          <a:chExt cx="0" cy="0"/>
-        </a:xfrm>
-      </p:grpSpPr>
-      <p:sp>
-        <p:nvSpPr>
-          <p:cNvPr id="2" name="Title 1"/>
-          <p:cNvSpPr>
-            <a:spLocks noGrp="1"/>
-          </p:cNvSpPr>
-          <p:nvPr>
-            <p:ph type="title"/>
-          </p:nvPr>
-        </p:nvSpPr>
-        <p:spPr/>
-        <p:txBody>
-          <a:bodyPr/>
-          <a:lstStyle/>
-          <a:p>
-            <a:r>
-              <a:rPr lang="en-US" dirty="0"/>
-              <a:t>Sentiment Analysis</a:t>
-            </a:r>
-          </a:p>
-        </p:txBody>
-      </p:sp>
-      <p:sp>
-        <p:nvSpPr>
-          <p:cNvPr id="3" name="Content Placeholder 2"/>
-          <p:cNvSpPr>
-            <a:spLocks noGrp="1"/>
-          </p:cNvSpPr>
-          <p:nvPr>
-            <p:ph idx="1"/>
-          </p:nvPr>
-        </p:nvSpPr>
-        <p:spPr/>
-        <p:txBody>
-          <a:bodyPr/>
-          <a:lstStyle/>
-          <a:p>
-            <a:r>
-              <a:rPr lang="en-US" dirty="0"/>
-              <a:t>But how does a text convey feeling?</a:t>
-            </a:r>
-          </a:p>
-          <a:p>
-            <a:r>
-              <a:rPr lang="en-US" dirty="0"/>
-              <a:t>Is it happy? Sad? Positive or negative?</a:t>
-            </a:r>
-          </a:p>
-          <a:p>
-            <a:r>
-              <a:rPr lang="en-US" dirty="0"/>
-              <a:t>Complicated questions!</a:t>
-            </a:r>
-          </a:p>
-          <a:p>
-            <a:r>
-              <a:rPr lang="en-US" dirty="0"/>
-              <a:t>Let’s try to tell with simple examples…</a:t>
-            </a:r>
-          </a:p>
-        </p:txBody>
-      </p:sp>
-    </p:spTree>
-    <p:extLst>
-      <p:ext uri="{BB962C8B-B14F-4D97-AF65-F5344CB8AC3E}">
-        <p14:creationId xmlns:p14="http://schemas.microsoft.com/office/powerpoint/2010/main" val="129063420"/>
       </p:ext>
     </p:extLst>
   </p:cSld>

</xml_diff>